<commit_message>
Cleaning up manuscript_code folder for organization
</commit_message>
<xml_diff>
--- a/manuscript_code/manuscript_analysis_workflow.pptx
+++ b/manuscript_code/manuscript_analysis_workflow.pptx
@@ -7,6 +7,7 @@
   <p:sldIdLst>
     <p:sldId id="261" r:id="rId2"/>
     <p:sldId id="260" r:id="rId3"/>
+    <p:sldId id="262" r:id="rId4"/>
   </p:sldIdLst>
   <p:sldSz cx="12192000" cy="6858000"/>
   <p:notesSz cx="6858000" cy="9144000"/>
@@ -105,7 +106,217 @@
       </a:defRPr>
     </a:lvl9pPr>
   </p:defaultTextStyle>
+  <p:extLst>
+    <p:ext uri="{EFAFB233-063F-42B5-8137-9DF3F51BA10A}">
+      <p15:sldGuideLst xmlns:p15="http://schemas.microsoft.com/office/powerpoint/2012/main"/>
+    </p:ext>
+  </p:extLst>
 </p:presentation>
+</file>
+
+<file path=ppt/revisionInfo.xml><?xml version="1.0" encoding="utf-8"?>
+<p1510:revInfo xmlns:a="http://schemas.openxmlformats.org/drawingml/2006/main" xmlns:r="http://schemas.openxmlformats.org/officeDocument/2006/relationships" xmlns:p1510="http://schemas.microsoft.com/office/powerpoint/2015/10/main">
+  <p1510:revLst>
+    <p1510:client id="{091F54CB-6B4F-4F37-89F8-1FD706F32F37}" v="1" dt="2025-02-05T23:12:32.897"/>
+  </p1510:revLst>
+</p1510:revInfo>
+</file>
+
+<file path=ppt/changesInfos/changesInfo1.xml><?xml version="1.0" encoding="utf-8"?>
+<pc:chgInfo xmlns:a="http://schemas.openxmlformats.org/drawingml/2006/main" xmlns:r="http://schemas.openxmlformats.org/officeDocument/2006/relationships" xmlns:ac="http://schemas.microsoft.com/office/drawing/2013/main/command" xmlns:pc="http://schemas.microsoft.com/office/powerpoint/2013/main/command">
+  <pc:docChgLst>
+    <pc:chgData name="Pien, Catarina L" userId="055f424c-5a88-4e6e-9e88-d4462ff2eeee" providerId="ADAL" clId="{091F54CB-6B4F-4F37-89F8-1FD706F32F37}"/>
+    <pc:docChg chg="custSel addSld modSld">
+      <pc:chgData name="Pien, Catarina L" userId="055f424c-5a88-4e6e-9e88-d4462ff2eeee" providerId="ADAL" clId="{091F54CB-6B4F-4F37-89F8-1FD706F32F37}" dt="2025-02-05T23:28:07.027" v="26" actId="20577"/>
+      <pc:docMkLst>
+        <pc:docMk/>
+      </pc:docMkLst>
+      <pc:sldChg chg="delSp modSp add mod">
+        <pc:chgData name="Pien, Catarina L" userId="055f424c-5a88-4e6e-9e88-d4462ff2eeee" providerId="ADAL" clId="{091F54CB-6B4F-4F37-89F8-1FD706F32F37}" dt="2025-02-05T23:28:07.027" v="26" actId="20577"/>
+        <pc:sldMkLst>
+          <pc:docMk/>
+          <pc:sldMk cId="605564297" sldId="262"/>
+        </pc:sldMkLst>
+        <pc:spChg chg="del">
+          <ac:chgData name="Pien, Catarina L" userId="055f424c-5a88-4e6e-9e88-d4462ff2eeee" providerId="ADAL" clId="{091F54CB-6B4F-4F37-89F8-1FD706F32F37}" dt="2025-02-05T23:27:33.065" v="17" actId="478"/>
+          <ac:spMkLst>
+            <pc:docMk/>
+            <pc:sldMk cId="605564297" sldId="262"/>
+            <ac:spMk id="6" creationId="{58697BA5-ABAA-21E4-87A4-C6090CF07AEF}"/>
+          </ac:spMkLst>
+        </pc:spChg>
+        <pc:spChg chg="del">
+          <ac:chgData name="Pien, Catarina L" userId="055f424c-5a88-4e6e-9e88-d4462ff2eeee" providerId="ADAL" clId="{091F54CB-6B4F-4F37-89F8-1FD706F32F37}" dt="2025-02-05T23:27:31.265" v="15" actId="478"/>
+          <ac:spMkLst>
+            <pc:docMk/>
+            <pc:sldMk cId="605564297" sldId="262"/>
+            <ac:spMk id="9" creationId="{438C53DC-797D-2944-08F0-73835262CECF}"/>
+          </ac:spMkLst>
+        </pc:spChg>
+        <pc:spChg chg="del">
+          <ac:chgData name="Pien, Catarina L" userId="055f424c-5a88-4e6e-9e88-d4462ff2eeee" providerId="ADAL" clId="{091F54CB-6B4F-4F37-89F8-1FD706F32F37}" dt="2025-02-05T23:27:22.507" v="7" actId="478"/>
+          <ac:spMkLst>
+            <pc:docMk/>
+            <pc:sldMk cId="605564297" sldId="262"/>
+            <ac:spMk id="11" creationId="{D1703C90-4C16-73CC-9CC7-42F3D28405FE}"/>
+          </ac:spMkLst>
+        </pc:spChg>
+        <pc:spChg chg="del">
+          <ac:chgData name="Pien, Catarina L" userId="055f424c-5a88-4e6e-9e88-d4462ff2eeee" providerId="ADAL" clId="{091F54CB-6B4F-4F37-89F8-1FD706F32F37}" dt="2025-02-05T23:27:29.904" v="13" actId="478"/>
+          <ac:spMkLst>
+            <pc:docMk/>
+            <pc:sldMk cId="605564297" sldId="262"/>
+            <ac:spMk id="14" creationId="{7E37771D-EB7F-6560-B35F-C4880D5432CA}"/>
+          </ac:spMkLst>
+        </pc:spChg>
+        <pc:spChg chg="del">
+          <ac:chgData name="Pien, Catarina L" userId="055f424c-5a88-4e6e-9e88-d4462ff2eeee" providerId="ADAL" clId="{091F54CB-6B4F-4F37-89F8-1FD706F32F37}" dt="2025-02-05T23:27:17.829" v="5" actId="478"/>
+          <ac:spMkLst>
+            <pc:docMk/>
+            <pc:sldMk cId="605564297" sldId="262"/>
+            <ac:spMk id="19" creationId="{D25ED188-89A6-0050-A89A-1953C1F94FCC}"/>
+          </ac:spMkLst>
+        </pc:spChg>
+        <pc:spChg chg="mod">
+          <ac:chgData name="Pien, Catarina L" userId="055f424c-5a88-4e6e-9e88-d4462ff2eeee" providerId="ADAL" clId="{091F54CB-6B4F-4F37-89F8-1FD706F32F37}" dt="2025-02-05T23:28:07.027" v="26" actId="20577"/>
+          <ac:spMkLst>
+            <pc:docMk/>
+            <pc:sldMk cId="605564297" sldId="262"/>
+            <ac:spMk id="23" creationId="{F9BAE556-25F7-2237-1D71-D7BEF6073B0C}"/>
+          </ac:spMkLst>
+        </pc:spChg>
+        <pc:spChg chg="del">
+          <ac:chgData name="Pien, Catarina L" userId="055f424c-5a88-4e6e-9e88-d4462ff2eeee" providerId="ADAL" clId="{091F54CB-6B4F-4F37-89F8-1FD706F32F37}" dt="2025-02-05T23:27:23.953" v="8" actId="478"/>
+          <ac:spMkLst>
+            <pc:docMk/>
+            <pc:sldMk cId="605564297" sldId="262"/>
+            <ac:spMk id="25" creationId="{557828AC-BADC-AD5E-DCBC-2DCEA4F63F2A}"/>
+          </ac:spMkLst>
+        </pc:spChg>
+        <pc:spChg chg="del">
+          <ac:chgData name="Pien, Catarina L" userId="055f424c-5a88-4e6e-9e88-d4462ff2eeee" providerId="ADAL" clId="{091F54CB-6B4F-4F37-89F8-1FD706F32F37}" dt="2025-02-05T23:27:25.664" v="11" actId="478"/>
+          <ac:spMkLst>
+            <pc:docMk/>
+            <pc:sldMk cId="605564297" sldId="262"/>
+            <ac:spMk id="40" creationId="{ACD83F5C-FE46-3D23-D7AC-A464C9B9548E}"/>
+          </ac:spMkLst>
+        </pc:spChg>
+        <pc:spChg chg="del">
+          <ac:chgData name="Pien, Catarina L" userId="055f424c-5a88-4e6e-9e88-d4462ff2eeee" providerId="ADAL" clId="{091F54CB-6B4F-4F37-89F8-1FD706F32F37}" dt="2025-02-05T23:27:39.336" v="19" actId="478"/>
+          <ac:spMkLst>
+            <pc:docMk/>
+            <pc:sldMk cId="605564297" sldId="262"/>
+            <ac:spMk id="42" creationId="{28E45BBB-0164-159C-B7D1-BC3C09A5B740}"/>
+          </ac:spMkLst>
+        </pc:spChg>
+        <pc:spChg chg="del">
+          <ac:chgData name="Pien, Catarina L" userId="055f424c-5a88-4e6e-9e88-d4462ff2eeee" providerId="ADAL" clId="{091F54CB-6B4F-4F37-89F8-1FD706F32F37}" dt="2025-02-05T23:27:15.826" v="3" actId="478"/>
+          <ac:spMkLst>
+            <pc:docMk/>
+            <pc:sldMk cId="605564297" sldId="262"/>
+            <ac:spMk id="47" creationId="{6D6C5557-7ACE-059D-04C7-58D5B6521911}"/>
+          </ac:spMkLst>
+        </pc:spChg>
+        <pc:spChg chg="del">
+          <ac:chgData name="Pien, Catarina L" userId="055f424c-5a88-4e6e-9e88-d4462ff2eeee" providerId="ADAL" clId="{091F54CB-6B4F-4F37-89F8-1FD706F32F37}" dt="2025-02-05T23:27:13.791" v="1" actId="478"/>
+          <ac:spMkLst>
+            <pc:docMk/>
+            <pc:sldMk cId="605564297" sldId="262"/>
+            <ac:spMk id="49" creationId="{203E42A9-F2DF-767F-FF17-49CB7243598F}"/>
+          </ac:spMkLst>
+        </pc:spChg>
+        <pc:spChg chg="del">
+          <ac:chgData name="Pien, Catarina L" userId="055f424c-5a88-4e6e-9e88-d4462ff2eeee" providerId="ADAL" clId="{091F54CB-6B4F-4F37-89F8-1FD706F32F37}" dt="2025-02-05T23:27:41.873" v="20" actId="478"/>
+          <ac:spMkLst>
+            <pc:docMk/>
+            <pc:sldMk cId="605564297" sldId="262"/>
+            <ac:spMk id="53" creationId="{96FEC323-2B4D-5AF6-87C4-D9D3873E5D77}"/>
+          </ac:spMkLst>
+        </pc:spChg>
+        <pc:cxnChg chg="del mod">
+          <ac:chgData name="Pien, Catarina L" userId="055f424c-5a88-4e6e-9e88-d4462ff2eeee" providerId="ADAL" clId="{091F54CB-6B4F-4F37-89F8-1FD706F32F37}" dt="2025-02-05T23:27:24.584" v="9" actId="478"/>
+          <ac:cxnSpMkLst>
+            <pc:docMk/>
+            <pc:sldMk cId="605564297" sldId="262"/>
+            <ac:cxnSpMk id="27" creationId="{AFD8F65D-9E99-07F2-4247-F737AD1F591C}"/>
+          </ac:cxnSpMkLst>
+        </pc:cxnChg>
+        <pc:cxnChg chg="del mod">
+          <ac:chgData name="Pien, Catarina L" userId="055f424c-5a88-4e6e-9e88-d4462ff2eeee" providerId="ADAL" clId="{091F54CB-6B4F-4F37-89F8-1FD706F32F37}" dt="2025-02-05T23:27:16.779" v="4" actId="478"/>
+          <ac:cxnSpMkLst>
+            <pc:docMk/>
+            <pc:sldMk cId="605564297" sldId="262"/>
+            <ac:cxnSpMk id="28" creationId="{39290B2B-6E0D-1322-76A2-A1B61D9881D3}"/>
+          </ac:cxnSpMkLst>
+        </pc:cxnChg>
+        <pc:cxnChg chg="del mod">
+          <ac:chgData name="Pien, Catarina L" userId="055f424c-5a88-4e6e-9e88-d4462ff2eeee" providerId="ADAL" clId="{091F54CB-6B4F-4F37-89F8-1FD706F32F37}" dt="2025-02-05T23:27:34.001" v="18" actId="478"/>
+          <ac:cxnSpMkLst>
+            <pc:docMk/>
+            <pc:sldMk cId="605564297" sldId="262"/>
+            <ac:cxnSpMk id="32" creationId="{FBF7D625-ED49-623D-9631-5AC31029219B}"/>
+          </ac:cxnSpMkLst>
+        </pc:cxnChg>
+        <pc:cxnChg chg="del mod">
+          <ac:chgData name="Pien, Catarina L" userId="055f424c-5a88-4e6e-9e88-d4462ff2eeee" providerId="ADAL" clId="{091F54CB-6B4F-4F37-89F8-1FD706F32F37}" dt="2025-02-05T23:27:32.338" v="16" actId="478"/>
+          <ac:cxnSpMkLst>
+            <pc:docMk/>
+            <pc:sldMk cId="605564297" sldId="262"/>
+            <ac:cxnSpMk id="37" creationId="{50AD5B21-AE23-232F-3294-C9F00346E938}"/>
+          </ac:cxnSpMkLst>
+        </pc:cxnChg>
+        <pc:cxnChg chg="del mod">
+          <ac:chgData name="Pien, Catarina L" userId="055f424c-5a88-4e6e-9e88-d4462ff2eeee" providerId="ADAL" clId="{091F54CB-6B4F-4F37-89F8-1FD706F32F37}" dt="2025-02-05T23:27:30.729" v="14" actId="478"/>
+          <ac:cxnSpMkLst>
+            <pc:docMk/>
+            <pc:sldMk cId="605564297" sldId="262"/>
+            <ac:cxnSpMk id="39" creationId="{BF72849E-8929-870D-2888-508EA93212ED}"/>
+          </ac:cxnSpMkLst>
+        </pc:cxnChg>
+        <pc:cxnChg chg="del mod">
+          <ac:chgData name="Pien, Catarina L" userId="055f424c-5a88-4e6e-9e88-d4462ff2eeee" providerId="ADAL" clId="{091F54CB-6B4F-4F37-89F8-1FD706F32F37}" dt="2025-02-05T23:27:19.898" v="6" actId="478"/>
+          <ac:cxnSpMkLst>
+            <pc:docMk/>
+            <pc:sldMk cId="605564297" sldId="262"/>
+            <ac:cxnSpMk id="48" creationId="{ED40A7BE-16D0-AF1A-DE05-819769035987}"/>
+          </ac:cxnSpMkLst>
+        </pc:cxnChg>
+        <pc:cxnChg chg="del mod">
+          <ac:chgData name="Pien, Catarina L" userId="055f424c-5a88-4e6e-9e88-d4462ff2eeee" providerId="ADAL" clId="{091F54CB-6B4F-4F37-89F8-1FD706F32F37}" dt="2025-02-05T23:27:25.080" v="10" actId="478"/>
+          <ac:cxnSpMkLst>
+            <pc:docMk/>
+            <pc:sldMk cId="605564297" sldId="262"/>
+            <ac:cxnSpMk id="59" creationId="{4C1189C7-2321-51D6-AEDA-2B33EA9AF447}"/>
+          </ac:cxnSpMkLst>
+        </pc:cxnChg>
+        <pc:cxnChg chg="mod">
+          <ac:chgData name="Pien, Catarina L" userId="055f424c-5a88-4e6e-9e88-d4462ff2eeee" providerId="ADAL" clId="{091F54CB-6B4F-4F37-89F8-1FD706F32F37}" dt="2025-02-05T23:27:39.336" v="19" actId="478"/>
+          <ac:cxnSpMkLst>
+            <pc:docMk/>
+            <pc:sldMk cId="605564297" sldId="262"/>
+            <ac:cxnSpMk id="69" creationId="{31CAE819-8F12-DE38-14EE-DCED047AE169}"/>
+          </ac:cxnSpMkLst>
+        </pc:cxnChg>
+        <pc:cxnChg chg="del mod">
+          <ac:chgData name="Pien, Catarina L" userId="055f424c-5a88-4e6e-9e88-d4462ff2eeee" providerId="ADAL" clId="{091F54CB-6B4F-4F37-89F8-1FD706F32F37}" dt="2025-02-05T23:27:28.929" v="12" actId="478"/>
+          <ac:cxnSpMkLst>
+            <pc:docMk/>
+            <pc:sldMk cId="605564297" sldId="262"/>
+            <ac:cxnSpMk id="70" creationId="{3D8DB7B3-9A68-52D4-52C4-915F43D4D3D9}"/>
+          </ac:cxnSpMkLst>
+        </pc:cxnChg>
+        <pc:cxnChg chg="del mod">
+          <ac:chgData name="Pien, Catarina L" userId="055f424c-5a88-4e6e-9e88-d4462ff2eeee" providerId="ADAL" clId="{091F54CB-6B4F-4F37-89F8-1FD706F32F37}" dt="2025-02-05T23:27:14.729" v="2" actId="478"/>
+          <ac:cxnSpMkLst>
+            <pc:docMk/>
+            <pc:sldMk cId="605564297" sldId="262"/>
+            <ac:cxnSpMk id="71" creationId="{6BD5D29F-0FE3-C0DF-24B4-1FBE47F63C42}"/>
+          </ac:cxnSpMkLst>
+        </pc:cxnChg>
+      </pc:sldChg>
+    </pc:docChg>
+  </pc:docChgLst>
+</pc:chgInfo>
 </file>
 
 <file path=ppt/slideLayouts/slideLayout1.xml><?xml version="1.0" encoding="utf-8"?>
@@ -255,7 +466,7 @@
           <a:p>
             <a:fld id="{CB6AC693-58D9-4564-A4FC-DE29779A6B40}" type="datetimeFigureOut">
               <a:rPr lang="en-US" smtClean="0"/>
-              <a:t>6/23/2023</a:t>
+              <a:t>2/5/2025</a:t>
             </a:fld>
             <a:endParaRPr lang="en-US"/>
           </a:p>
@@ -453,7 +664,7 @@
           <a:p>
             <a:fld id="{CB6AC693-58D9-4564-A4FC-DE29779A6B40}" type="datetimeFigureOut">
               <a:rPr lang="en-US" smtClean="0"/>
-              <a:t>6/23/2023</a:t>
+              <a:t>2/5/2025</a:t>
             </a:fld>
             <a:endParaRPr lang="en-US"/>
           </a:p>
@@ -661,7 +872,7 @@
           <a:p>
             <a:fld id="{CB6AC693-58D9-4564-A4FC-DE29779A6B40}" type="datetimeFigureOut">
               <a:rPr lang="en-US" smtClean="0"/>
-              <a:t>6/23/2023</a:t>
+              <a:t>2/5/2025</a:t>
             </a:fld>
             <a:endParaRPr lang="en-US"/>
           </a:p>
@@ -859,7 +1070,7 @@
           <a:p>
             <a:fld id="{CB6AC693-58D9-4564-A4FC-DE29779A6B40}" type="datetimeFigureOut">
               <a:rPr lang="en-US" smtClean="0"/>
-              <a:t>6/23/2023</a:t>
+              <a:t>2/5/2025</a:t>
             </a:fld>
             <a:endParaRPr lang="en-US"/>
           </a:p>
@@ -1134,7 +1345,7 @@
           <a:p>
             <a:fld id="{CB6AC693-58D9-4564-A4FC-DE29779A6B40}" type="datetimeFigureOut">
               <a:rPr lang="en-US" smtClean="0"/>
-              <a:t>6/23/2023</a:t>
+              <a:t>2/5/2025</a:t>
             </a:fld>
             <a:endParaRPr lang="en-US"/>
           </a:p>
@@ -1399,7 +1610,7 @@
           <a:p>
             <a:fld id="{CB6AC693-58D9-4564-A4FC-DE29779A6B40}" type="datetimeFigureOut">
               <a:rPr lang="en-US" smtClean="0"/>
-              <a:t>6/23/2023</a:t>
+              <a:t>2/5/2025</a:t>
             </a:fld>
             <a:endParaRPr lang="en-US"/>
           </a:p>
@@ -1811,7 +2022,7 @@
           <a:p>
             <a:fld id="{CB6AC693-58D9-4564-A4FC-DE29779A6B40}" type="datetimeFigureOut">
               <a:rPr lang="en-US" smtClean="0"/>
-              <a:t>6/23/2023</a:t>
+              <a:t>2/5/2025</a:t>
             </a:fld>
             <a:endParaRPr lang="en-US"/>
           </a:p>
@@ -1952,7 +2163,7 @@
           <a:p>
             <a:fld id="{CB6AC693-58D9-4564-A4FC-DE29779A6B40}" type="datetimeFigureOut">
               <a:rPr lang="en-US" smtClean="0"/>
-              <a:t>6/23/2023</a:t>
+              <a:t>2/5/2025</a:t>
             </a:fld>
             <a:endParaRPr lang="en-US"/>
           </a:p>
@@ -2065,7 +2276,7 @@
           <a:p>
             <a:fld id="{CB6AC693-58D9-4564-A4FC-DE29779A6B40}" type="datetimeFigureOut">
               <a:rPr lang="en-US" smtClean="0"/>
-              <a:t>6/23/2023</a:t>
+              <a:t>2/5/2025</a:t>
             </a:fld>
             <a:endParaRPr lang="en-US"/>
           </a:p>
@@ -2376,7 +2587,7 @@
           <a:p>
             <a:fld id="{CB6AC693-58D9-4564-A4FC-DE29779A6B40}" type="datetimeFigureOut">
               <a:rPr lang="en-US" smtClean="0"/>
-              <a:t>6/23/2023</a:t>
+              <a:t>2/5/2025</a:t>
             </a:fld>
             <a:endParaRPr lang="en-US"/>
           </a:p>
@@ -2664,7 +2875,7 @@
           <a:p>
             <a:fld id="{CB6AC693-58D9-4564-A4FC-DE29779A6B40}" type="datetimeFigureOut">
               <a:rPr lang="en-US" smtClean="0"/>
-              <a:t>6/23/2023</a:t>
+              <a:t>2/5/2025</a:t>
             </a:fld>
             <a:endParaRPr lang="en-US"/>
           </a:p>
@@ -2905,7 +3116,7 @@
           <a:p>
             <a:fld id="{CB6AC693-58D9-4564-A4FC-DE29779A6B40}" type="datetimeFigureOut">
               <a:rPr lang="en-US" smtClean="0"/>
-              <a:t>6/23/2023</a:t>
+              <a:t>2/5/2025</a:t>
             </a:fld>
             <a:endParaRPr lang="en-US"/>
           </a:p>
@@ -7848,6 +8059,2416 @@
 </p:sld>
 </file>
 
+<file path=ppt/slides/slide3.xml><?xml version="1.0" encoding="utf-8"?>
+<p:sld xmlns:a="http://schemas.openxmlformats.org/drawingml/2006/main" xmlns:r="http://schemas.openxmlformats.org/officeDocument/2006/relationships" xmlns:p="http://schemas.openxmlformats.org/presentationml/2006/main">
+  <p:cSld>
+    <p:spTree>
+      <p:nvGrpSpPr>
+        <p:cNvPr id="1" name="">
+          <a:extLst>
+            <a:ext uri="{FF2B5EF4-FFF2-40B4-BE49-F238E27FC236}">
+              <a16:creationId xmlns:a16="http://schemas.microsoft.com/office/drawing/2014/main" id="{480D82A9-EC4E-253D-F851-85C5C658C924}"/>
+            </a:ext>
+          </a:extLst>
+        </p:cNvPr>
+        <p:cNvGrpSpPr/>
+        <p:nvPr/>
+      </p:nvGrpSpPr>
+      <p:grpSpPr>
+        <a:xfrm>
+          <a:off x="0" y="0"/>
+          <a:ext cx="0" cy="0"/>
+          <a:chOff x="0" y="0"/>
+          <a:chExt cx="0" cy="0"/>
+        </a:xfrm>
+      </p:grpSpPr>
+      <p:sp>
+        <p:nvSpPr>
+          <p:cNvPr id="4" name="Rectangle 3">
+            <a:extLst>
+              <a:ext uri="{FF2B5EF4-FFF2-40B4-BE49-F238E27FC236}">
+                <a16:creationId xmlns:a16="http://schemas.microsoft.com/office/drawing/2014/main" id="{F43FA6C6-5E50-2AF6-CD77-DEF51FD086A8}"/>
+              </a:ext>
+            </a:extLst>
+          </p:cNvPr>
+          <p:cNvSpPr/>
+          <p:nvPr/>
+        </p:nvSpPr>
+        <p:spPr>
+          <a:xfrm>
+            <a:off x="4546833" y="1725703"/>
+            <a:ext cx="946153" cy="273476"/>
+          </a:xfrm>
+          <a:prstGeom prst="rect">
+            <a:avLst/>
+          </a:prstGeom>
+          <a:solidFill>
+            <a:schemeClr val="bg1"/>
+          </a:solidFill>
+          <a:ln>
+            <a:solidFill>
+              <a:schemeClr val="accent3">
+                <a:lumMod val="75000"/>
+              </a:schemeClr>
+            </a:solidFill>
+          </a:ln>
+        </p:spPr>
+        <p:style>
+          <a:lnRef idx="2">
+            <a:schemeClr val="accent1">
+              <a:shade val="50000"/>
+            </a:schemeClr>
+          </a:lnRef>
+          <a:fillRef idx="1">
+            <a:schemeClr val="accent1"/>
+          </a:fillRef>
+          <a:effectRef idx="0">
+            <a:schemeClr val="accent1"/>
+          </a:effectRef>
+          <a:fontRef idx="minor">
+            <a:schemeClr val="lt1"/>
+          </a:fontRef>
+        </p:style>
+        <p:txBody>
+          <a:bodyPr rtlCol="0" anchor="ctr"/>
+          <a:lstStyle/>
+          <a:p>
+            <a:pPr algn="ctr"/>
+            <a:r>
+              <a:rPr lang="en-US" sz="733" dirty="0" err="1">
+                <a:solidFill>
+                  <a:schemeClr val="tx1"/>
+                </a:solidFill>
+              </a:rPr>
+              <a:t>Temp_filtered.rds</a:t>
+            </a:r>
+            <a:endParaRPr lang="en-US" sz="733" dirty="0">
+              <a:solidFill>
+                <a:schemeClr val="tx1"/>
+              </a:solidFill>
+            </a:endParaRPr>
+          </a:p>
+        </p:txBody>
+      </p:sp>
+      <p:sp>
+        <p:nvSpPr>
+          <p:cNvPr id="12" name="Rectangle: Rounded Corners 11">
+            <a:extLst>
+              <a:ext uri="{FF2B5EF4-FFF2-40B4-BE49-F238E27FC236}">
+                <a16:creationId xmlns:a16="http://schemas.microsoft.com/office/drawing/2014/main" id="{B0A7610D-8D18-3062-2BF7-7B93C2A7C9EF}"/>
+              </a:ext>
+            </a:extLst>
+          </p:cNvPr>
+          <p:cNvSpPr/>
+          <p:nvPr/>
+        </p:nvSpPr>
+        <p:spPr>
+          <a:xfrm>
+            <a:off x="7894016" y="3512928"/>
+            <a:ext cx="1017865" cy="261358"/>
+          </a:xfrm>
+          <a:prstGeom prst="roundRect">
+            <a:avLst/>
+          </a:prstGeom>
+          <a:solidFill>
+            <a:schemeClr val="bg1"/>
+          </a:solidFill>
+          <a:ln>
+            <a:solidFill>
+              <a:schemeClr val="accent2"/>
+            </a:solidFill>
+          </a:ln>
+        </p:spPr>
+        <p:style>
+          <a:lnRef idx="2">
+            <a:schemeClr val="accent1">
+              <a:shade val="50000"/>
+            </a:schemeClr>
+          </a:lnRef>
+          <a:fillRef idx="1">
+            <a:schemeClr val="accent1"/>
+          </a:fillRef>
+          <a:effectRef idx="0">
+            <a:schemeClr val="accent1"/>
+          </a:effectRef>
+          <a:fontRef idx="minor">
+            <a:schemeClr val="lt1"/>
+          </a:fontRef>
+        </p:style>
+        <p:txBody>
+          <a:bodyPr rtlCol="0" anchor="ctr"/>
+          <a:lstStyle/>
+          <a:p>
+            <a:pPr algn="ctr"/>
+            <a:r>
+              <a:rPr lang="en-US" sz="733" dirty="0" err="1">
+                <a:solidFill>
+                  <a:schemeClr val="tx1"/>
+                </a:solidFill>
+              </a:rPr>
+              <a:t>plot_variability_trends.Rmd</a:t>
+            </a:r>
+            <a:endParaRPr lang="en-US" sz="733" dirty="0">
+              <a:solidFill>
+                <a:schemeClr val="tx1"/>
+              </a:solidFill>
+            </a:endParaRPr>
+          </a:p>
+        </p:txBody>
+      </p:sp>
+      <p:sp>
+        <p:nvSpPr>
+          <p:cNvPr id="15" name="Rectangle: Rounded Corners 14">
+            <a:extLst>
+              <a:ext uri="{FF2B5EF4-FFF2-40B4-BE49-F238E27FC236}">
+                <a16:creationId xmlns:a16="http://schemas.microsoft.com/office/drawing/2014/main" id="{2C1EE68D-94FA-5BEF-5F59-D2110680EADF}"/>
+              </a:ext>
+            </a:extLst>
+          </p:cNvPr>
+          <p:cNvSpPr/>
+          <p:nvPr/>
+        </p:nvSpPr>
+        <p:spPr>
+          <a:xfrm>
+            <a:off x="4966344" y="2119564"/>
+            <a:ext cx="1193666" cy="261358"/>
+          </a:xfrm>
+          <a:prstGeom prst="roundRect">
+            <a:avLst/>
+          </a:prstGeom>
+          <a:solidFill>
+            <a:schemeClr val="bg1"/>
+          </a:solidFill>
+          <a:ln>
+            <a:solidFill>
+              <a:schemeClr val="accent2"/>
+            </a:solidFill>
+          </a:ln>
+        </p:spPr>
+        <p:style>
+          <a:lnRef idx="2">
+            <a:schemeClr val="accent1">
+              <a:shade val="50000"/>
+            </a:schemeClr>
+          </a:lnRef>
+          <a:fillRef idx="1">
+            <a:schemeClr val="accent1"/>
+          </a:fillRef>
+          <a:effectRef idx="0">
+            <a:schemeClr val="accent1"/>
+          </a:effectRef>
+          <a:fontRef idx="minor">
+            <a:schemeClr val="lt1"/>
+          </a:fontRef>
+        </p:style>
+        <p:txBody>
+          <a:bodyPr rtlCol="0" anchor="ctr"/>
+          <a:lstStyle/>
+          <a:p>
+            <a:pPr algn="ctr"/>
+            <a:r>
+              <a:rPr lang="en-US" sz="733" dirty="0" err="1">
+                <a:solidFill>
+                  <a:schemeClr val="tx1"/>
+                </a:solidFill>
+              </a:rPr>
+              <a:t>prepare_datasets.Rmd</a:t>
+            </a:r>
+            <a:endParaRPr lang="en-US" sz="733" dirty="0">
+              <a:solidFill>
+                <a:schemeClr val="tx1"/>
+              </a:solidFill>
+            </a:endParaRPr>
+          </a:p>
+        </p:txBody>
+      </p:sp>
+      <p:sp>
+        <p:nvSpPr>
+          <p:cNvPr id="17" name="Rectangle 16">
+            <a:extLst>
+              <a:ext uri="{FF2B5EF4-FFF2-40B4-BE49-F238E27FC236}">
+                <a16:creationId xmlns:a16="http://schemas.microsoft.com/office/drawing/2014/main" id="{B704C6CB-B729-16FE-0C07-88E0C662B4E0}"/>
+              </a:ext>
+            </a:extLst>
+          </p:cNvPr>
+          <p:cNvSpPr/>
+          <p:nvPr/>
+        </p:nvSpPr>
+        <p:spPr>
+          <a:xfrm>
+            <a:off x="6908861" y="2537357"/>
+            <a:ext cx="1618709" cy="393383"/>
+          </a:xfrm>
+          <a:prstGeom prst="rect">
+            <a:avLst/>
+          </a:prstGeom>
+          <a:solidFill>
+            <a:schemeClr val="bg1"/>
+          </a:solidFill>
+          <a:ln>
+            <a:solidFill>
+              <a:schemeClr val="accent3">
+                <a:lumMod val="75000"/>
+              </a:schemeClr>
+            </a:solidFill>
+          </a:ln>
+        </p:spPr>
+        <p:style>
+          <a:lnRef idx="2">
+            <a:schemeClr val="accent1">
+              <a:shade val="50000"/>
+            </a:schemeClr>
+          </a:lnRef>
+          <a:fillRef idx="1">
+            <a:schemeClr val="accent1"/>
+          </a:fillRef>
+          <a:effectRef idx="0">
+            <a:schemeClr val="accent1"/>
+          </a:effectRef>
+          <a:fontRef idx="minor">
+            <a:schemeClr val="lt1"/>
+          </a:fontRef>
+        </p:style>
+        <p:txBody>
+          <a:bodyPr rtlCol="0" anchor="ctr"/>
+          <a:lstStyle/>
+          <a:p>
+            <a:pPr marL="114306" indent="-114306" algn="ctr">
+              <a:buFont typeface="Arial" panose="020B0604020202020204" pitchFamily="34" charset="0"/>
+              <a:buChar char="•"/>
+            </a:pPr>
+            <a:r>
+              <a:rPr lang="en-US" sz="733" dirty="0">
+                <a:solidFill>
+                  <a:schemeClr val="tx1"/>
+                </a:solidFill>
+              </a:rPr>
+              <a:t>temp10years_20230601.rds (hourly)</a:t>
+            </a:r>
+          </a:p>
+          <a:p>
+            <a:pPr marL="114306" indent="-114306" algn="ctr">
+              <a:buFont typeface="Arial" panose="020B0604020202020204" pitchFamily="34" charset="0"/>
+              <a:buChar char="•"/>
+            </a:pPr>
+            <a:r>
+              <a:rPr lang="en-US" sz="733" dirty="0" err="1">
+                <a:solidFill>
+                  <a:schemeClr val="tx1"/>
+                </a:solidFill>
+              </a:rPr>
+              <a:t>tempDaily.rds</a:t>
+            </a:r>
+            <a:endParaRPr lang="en-US" sz="733" dirty="0">
+              <a:solidFill>
+                <a:schemeClr val="tx1"/>
+              </a:solidFill>
+            </a:endParaRPr>
+          </a:p>
+        </p:txBody>
+      </p:sp>
+      <p:sp>
+        <p:nvSpPr>
+          <p:cNvPr id="18" name="Rectangle 17">
+            <a:extLst>
+              <a:ext uri="{FF2B5EF4-FFF2-40B4-BE49-F238E27FC236}">
+                <a16:creationId xmlns:a16="http://schemas.microsoft.com/office/drawing/2014/main" id="{59397853-4D08-439B-AE03-564CA9C2F517}"/>
+              </a:ext>
+            </a:extLst>
+          </p:cNvPr>
+          <p:cNvSpPr/>
+          <p:nvPr/>
+        </p:nvSpPr>
+        <p:spPr>
+          <a:xfrm>
+            <a:off x="5604839" y="1733344"/>
+            <a:ext cx="1100088" cy="273476"/>
+          </a:xfrm>
+          <a:prstGeom prst="rect">
+            <a:avLst/>
+          </a:prstGeom>
+          <a:solidFill>
+            <a:schemeClr val="bg1"/>
+          </a:solidFill>
+          <a:ln>
+            <a:solidFill>
+              <a:schemeClr val="accent3">
+                <a:lumMod val="75000"/>
+              </a:schemeClr>
+            </a:solidFill>
+          </a:ln>
+        </p:spPr>
+        <p:style>
+          <a:lnRef idx="2">
+            <a:schemeClr val="accent1">
+              <a:shade val="50000"/>
+            </a:schemeClr>
+          </a:lnRef>
+          <a:fillRef idx="1">
+            <a:schemeClr val="accent1"/>
+          </a:fillRef>
+          <a:effectRef idx="0">
+            <a:schemeClr val="accent1"/>
+          </a:effectRef>
+          <a:fontRef idx="minor">
+            <a:schemeClr val="lt1"/>
+          </a:fontRef>
+        </p:style>
+        <p:txBody>
+          <a:bodyPr rtlCol="0" anchor="ctr"/>
+          <a:lstStyle/>
+          <a:p>
+            <a:pPr algn="ctr"/>
+            <a:r>
+              <a:rPr lang="en-US" sz="733" dirty="0">
+                <a:solidFill>
+                  <a:schemeClr val="tx1"/>
+                </a:solidFill>
+              </a:rPr>
+              <a:t>stations_w_regions_20230601.csv</a:t>
+            </a:r>
+          </a:p>
+        </p:txBody>
+      </p:sp>
+      <p:sp>
+        <p:nvSpPr>
+          <p:cNvPr id="20" name="Rectangle 19">
+            <a:extLst>
+              <a:ext uri="{FF2B5EF4-FFF2-40B4-BE49-F238E27FC236}">
+                <a16:creationId xmlns:a16="http://schemas.microsoft.com/office/drawing/2014/main" id="{B4691774-AF80-E689-6467-D72575B1CD66}"/>
+              </a:ext>
+            </a:extLst>
+          </p:cNvPr>
+          <p:cNvSpPr/>
+          <p:nvPr/>
+        </p:nvSpPr>
+        <p:spPr>
+          <a:xfrm>
+            <a:off x="4899341" y="2537357"/>
+            <a:ext cx="1327668" cy="393383"/>
+          </a:xfrm>
+          <a:prstGeom prst="rect">
+            <a:avLst/>
+          </a:prstGeom>
+          <a:solidFill>
+            <a:schemeClr val="bg1"/>
+          </a:solidFill>
+          <a:ln>
+            <a:solidFill>
+              <a:schemeClr val="accent3">
+                <a:lumMod val="75000"/>
+              </a:schemeClr>
+            </a:solidFill>
+          </a:ln>
+        </p:spPr>
+        <p:style>
+          <a:lnRef idx="2">
+            <a:schemeClr val="accent1">
+              <a:shade val="50000"/>
+            </a:schemeClr>
+          </a:lnRef>
+          <a:fillRef idx="1">
+            <a:schemeClr val="accent1"/>
+          </a:fillRef>
+          <a:effectRef idx="0">
+            <a:schemeClr val="accent1"/>
+          </a:effectRef>
+          <a:fontRef idx="minor">
+            <a:schemeClr val="lt1"/>
+          </a:fontRef>
+        </p:style>
+        <p:txBody>
+          <a:bodyPr rtlCol="0" anchor="ctr"/>
+          <a:lstStyle/>
+          <a:p>
+            <a:pPr marL="114306" indent="-114306" algn="ctr">
+              <a:buFont typeface="Arial" panose="020B0604020202020204" pitchFamily="34" charset="0"/>
+              <a:buChar char="•"/>
+            </a:pPr>
+            <a:r>
+              <a:rPr lang="en-US" sz="733" dirty="0" err="1">
+                <a:solidFill>
+                  <a:schemeClr val="tx1"/>
+                </a:solidFill>
+              </a:rPr>
+              <a:t>tempMonthly.rds</a:t>
+            </a:r>
+            <a:endParaRPr lang="en-US" sz="733" dirty="0">
+              <a:solidFill>
+                <a:schemeClr val="tx1"/>
+              </a:solidFill>
+            </a:endParaRPr>
+          </a:p>
+        </p:txBody>
+      </p:sp>
+      <p:cxnSp>
+        <p:nvCxnSpPr>
+          <p:cNvPr id="22" name="Straight Arrow Connector 21">
+            <a:extLst>
+              <a:ext uri="{FF2B5EF4-FFF2-40B4-BE49-F238E27FC236}">
+                <a16:creationId xmlns:a16="http://schemas.microsoft.com/office/drawing/2014/main" id="{34E5EDEB-0A0D-C0B2-458F-C90EB69C351C}"/>
+              </a:ext>
+            </a:extLst>
+          </p:cNvPr>
+          <p:cNvCxnSpPr>
+            <a:cxnSpLocks/>
+            <a:stCxn id="4" idx="2"/>
+            <a:endCxn id="15" idx="0"/>
+          </p:cNvCxnSpPr>
+          <p:nvPr/>
+        </p:nvCxnSpPr>
+        <p:spPr>
+          <a:xfrm>
+            <a:off x="5019910" y="1999179"/>
+            <a:ext cx="543267" cy="120385"/>
+          </a:xfrm>
+          <a:prstGeom prst="straightConnector1">
+            <a:avLst/>
+          </a:prstGeom>
+          <a:ln>
+            <a:tailEnd type="triangle"/>
+          </a:ln>
+        </p:spPr>
+        <p:style>
+          <a:lnRef idx="1">
+            <a:schemeClr val="accent1"/>
+          </a:lnRef>
+          <a:fillRef idx="0">
+            <a:schemeClr val="accent1"/>
+          </a:fillRef>
+          <a:effectRef idx="0">
+            <a:schemeClr val="accent1"/>
+          </a:effectRef>
+          <a:fontRef idx="minor">
+            <a:schemeClr val="tx1"/>
+          </a:fontRef>
+        </p:style>
+      </p:cxnSp>
+      <p:cxnSp>
+        <p:nvCxnSpPr>
+          <p:cNvPr id="24" name="Straight Arrow Connector 23">
+            <a:extLst>
+              <a:ext uri="{FF2B5EF4-FFF2-40B4-BE49-F238E27FC236}">
+                <a16:creationId xmlns:a16="http://schemas.microsoft.com/office/drawing/2014/main" id="{96BF84C7-E6B7-DFE5-DD86-941D52ADAB8C}"/>
+              </a:ext>
+            </a:extLst>
+          </p:cNvPr>
+          <p:cNvCxnSpPr>
+            <a:stCxn id="18" idx="2"/>
+            <a:endCxn id="15" idx="0"/>
+          </p:cNvCxnSpPr>
+          <p:nvPr/>
+        </p:nvCxnSpPr>
+        <p:spPr>
+          <a:xfrm flipH="1">
+            <a:off x="5563177" y="2006821"/>
+            <a:ext cx="591707" cy="112743"/>
+          </a:xfrm>
+          <a:prstGeom prst="straightConnector1">
+            <a:avLst/>
+          </a:prstGeom>
+          <a:ln>
+            <a:tailEnd type="triangle"/>
+          </a:ln>
+        </p:spPr>
+        <p:style>
+          <a:lnRef idx="1">
+            <a:schemeClr val="accent1"/>
+          </a:lnRef>
+          <a:fillRef idx="0">
+            <a:schemeClr val="accent1"/>
+          </a:fillRef>
+          <a:effectRef idx="0">
+            <a:schemeClr val="accent1"/>
+          </a:effectRef>
+          <a:fontRef idx="minor">
+            <a:schemeClr val="tx1"/>
+          </a:fontRef>
+        </p:style>
+      </p:cxnSp>
+      <p:cxnSp>
+        <p:nvCxnSpPr>
+          <p:cNvPr id="26" name="Straight Arrow Connector 25">
+            <a:extLst>
+              <a:ext uri="{FF2B5EF4-FFF2-40B4-BE49-F238E27FC236}">
+                <a16:creationId xmlns:a16="http://schemas.microsoft.com/office/drawing/2014/main" id="{2D1B099F-375D-E37C-E9ED-E525F7018395}"/>
+              </a:ext>
+            </a:extLst>
+          </p:cNvPr>
+          <p:cNvCxnSpPr>
+            <a:stCxn id="15" idx="2"/>
+            <a:endCxn id="20" idx="0"/>
+          </p:cNvCxnSpPr>
+          <p:nvPr/>
+        </p:nvCxnSpPr>
+        <p:spPr>
+          <a:xfrm flipH="1">
+            <a:off x="5563176" y="2380921"/>
+            <a:ext cx="1" cy="156435"/>
+          </a:xfrm>
+          <a:prstGeom prst="straightConnector1">
+            <a:avLst/>
+          </a:prstGeom>
+          <a:ln>
+            <a:tailEnd type="triangle"/>
+          </a:ln>
+        </p:spPr>
+        <p:style>
+          <a:lnRef idx="1">
+            <a:schemeClr val="accent1"/>
+          </a:lnRef>
+          <a:fillRef idx="0">
+            <a:schemeClr val="accent1"/>
+          </a:fillRef>
+          <a:effectRef idx="0">
+            <a:schemeClr val="accent1"/>
+          </a:effectRef>
+          <a:fontRef idx="minor">
+            <a:schemeClr val="tx1"/>
+          </a:fontRef>
+        </p:style>
+      </p:cxnSp>
+      <p:cxnSp>
+        <p:nvCxnSpPr>
+          <p:cNvPr id="30" name="Straight Arrow Connector 29">
+            <a:extLst>
+              <a:ext uri="{FF2B5EF4-FFF2-40B4-BE49-F238E27FC236}">
+                <a16:creationId xmlns:a16="http://schemas.microsoft.com/office/drawing/2014/main" id="{BD27022B-98BB-8008-CA22-6F5B18257735}"/>
+              </a:ext>
+            </a:extLst>
+          </p:cNvPr>
+          <p:cNvCxnSpPr>
+            <a:stCxn id="15" idx="2"/>
+            <a:endCxn id="17" idx="0"/>
+          </p:cNvCxnSpPr>
+          <p:nvPr/>
+        </p:nvCxnSpPr>
+        <p:spPr>
+          <a:xfrm>
+            <a:off x="5563177" y="2380921"/>
+            <a:ext cx="2155039" cy="156435"/>
+          </a:xfrm>
+          <a:prstGeom prst="straightConnector1">
+            <a:avLst/>
+          </a:prstGeom>
+          <a:ln>
+            <a:tailEnd type="triangle"/>
+          </a:ln>
+        </p:spPr>
+        <p:style>
+          <a:lnRef idx="1">
+            <a:schemeClr val="accent1"/>
+          </a:lnRef>
+          <a:fillRef idx="0">
+            <a:schemeClr val="accent1"/>
+          </a:fillRef>
+          <a:effectRef idx="0">
+            <a:schemeClr val="accent1"/>
+          </a:effectRef>
+          <a:fontRef idx="minor">
+            <a:schemeClr val="tx1"/>
+          </a:fontRef>
+        </p:style>
+      </p:cxnSp>
+      <p:cxnSp>
+        <p:nvCxnSpPr>
+          <p:cNvPr id="34" name="Straight Arrow Connector 33">
+            <a:extLst>
+              <a:ext uri="{FF2B5EF4-FFF2-40B4-BE49-F238E27FC236}">
+                <a16:creationId xmlns:a16="http://schemas.microsoft.com/office/drawing/2014/main" id="{0D7E2DBC-A919-230B-5661-1708356BDFC7}"/>
+              </a:ext>
+            </a:extLst>
+          </p:cNvPr>
+          <p:cNvCxnSpPr>
+            <a:cxnSpLocks/>
+            <a:stCxn id="17" idx="2"/>
+            <a:endCxn id="12" idx="0"/>
+          </p:cNvCxnSpPr>
+          <p:nvPr/>
+        </p:nvCxnSpPr>
+        <p:spPr>
+          <a:xfrm>
+            <a:off x="7718216" y="2930740"/>
+            <a:ext cx="684733" cy="582188"/>
+          </a:xfrm>
+          <a:prstGeom prst="straightConnector1">
+            <a:avLst/>
+          </a:prstGeom>
+          <a:ln>
+            <a:tailEnd type="triangle"/>
+          </a:ln>
+        </p:spPr>
+        <p:style>
+          <a:lnRef idx="1">
+            <a:schemeClr val="accent1"/>
+          </a:lnRef>
+          <a:fillRef idx="0">
+            <a:schemeClr val="accent1"/>
+          </a:fillRef>
+          <a:effectRef idx="0">
+            <a:schemeClr val="accent1"/>
+          </a:effectRef>
+          <a:fontRef idx="minor">
+            <a:schemeClr val="tx1"/>
+          </a:fontRef>
+        </p:style>
+      </p:cxnSp>
+      <p:sp>
+        <p:nvSpPr>
+          <p:cNvPr id="41" name="Rectangle: Rounded Corners 40">
+            <a:extLst>
+              <a:ext uri="{FF2B5EF4-FFF2-40B4-BE49-F238E27FC236}">
+                <a16:creationId xmlns:a16="http://schemas.microsoft.com/office/drawing/2014/main" id="{D83B6143-AA73-07D5-F339-758DB4A5084D}"/>
+              </a:ext>
+            </a:extLst>
+          </p:cNvPr>
+          <p:cNvSpPr/>
+          <p:nvPr/>
+        </p:nvSpPr>
+        <p:spPr>
+          <a:xfrm>
+            <a:off x="9879329" y="5426367"/>
+            <a:ext cx="1193666" cy="261358"/>
+          </a:xfrm>
+          <a:prstGeom prst="roundRect">
+            <a:avLst/>
+          </a:prstGeom>
+          <a:solidFill>
+            <a:schemeClr val="bg1"/>
+          </a:solidFill>
+          <a:ln>
+            <a:solidFill>
+              <a:schemeClr val="accent2"/>
+            </a:solidFill>
+          </a:ln>
+        </p:spPr>
+        <p:style>
+          <a:lnRef idx="2">
+            <a:schemeClr val="accent1">
+              <a:shade val="50000"/>
+            </a:schemeClr>
+          </a:lnRef>
+          <a:fillRef idx="1">
+            <a:schemeClr val="accent1"/>
+          </a:fillRef>
+          <a:effectRef idx="0">
+            <a:schemeClr val="accent1"/>
+          </a:effectRef>
+          <a:fontRef idx="minor">
+            <a:schemeClr val="lt1"/>
+          </a:fontRef>
+        </p:style>
+        <p:txBody>
+          <a:bodyPr rtlCol="0" anchor="ctr"/>
+          <a:lstStyle/>
+          <a:p>
+            <a:pPr algn="ctr"/>
+            <a:r>
+              <a:rPr lang="en-US" sz="733" dirty="0" err="1">
+                <a:solidFill>
+                  <a:schemeClr val="tx1"/>
+                </a:solidFill>
+              </a:rPr>
+              <a:t>model_native_nonnative.Rmd</a:t>
+            </a:r>
+            <a:endParaRPr lang="en-US" sz="733" dirty="0">
+              <a:solidFill>
+                <a:schemeClr val="tx1"/>
+              </a:solidFill>
+            </a:endParaRPr>
+          </a:p>
+        </p:txBody>
+      </p:sp>
+      <p:sp>
+        <p:nvSpPr>
+          <p:cNvPr id="57" name="Rectangle: Rounded Corners 56">
+            <a:extLst>
+              <a:ext uri="{FF2B5EF4-FFF2-40B4-BE49-F238E27FC236}">
+                <a16:creationId xmlns:a16="http://schemas.microsoft.com/office/drawing/2014/main" id="{5740D730-D25C-C3CD-1FBB-5D151FBA83BB}"/>
+              </a:ext>
+            </a:extLst>
+          </p:cNvPr>
+          <p:cNvSpPr/>
+          <p:nvPr/>
+        </p:nvSpPr>
+        <p:spPr>
+          <a:xfrm>
+            <a:off x="9047057" y="3521732"/>
+            <a:ext cx="1306354" cy="261358"/>
+          </a:xfrm>
+          <a:prstGeom prst="roundRect">
+            <a:avLst/>
+          </a:prstGeom>
+          <a:solidFill>
+            <a:schemeClr val="bg1"/>
+          </a:solidFill>
+          <a:ln>
+            <a:solidFill>
+              <a:schemeClr val="accent2"/>
+            </a:solidFill>
+          </a:ln>
+        </p:spPr>
+        <p:style>
+          <a:lnRef idx="2">
+            <a:schemeClr val="accent1">
+              <a:shade val="50000"/>
+            </a:schemeClr>
+          </a:lnRef>
+          <a:fillRef idx="1">
+            <a:schemeClr val="accent1"/>
+          </a:fillRef>
+          <a:effectRef idx="0">
+            <a:schemeClr val="accent1"/>
+          </a:effectRef>
+          <a:fontRef idx="minor">
+            <a:schemeClr val="lt1"/>
+          </a:fontRef>
+        </p:style>
+        <p:txBody>
+          <a:bodyPr rtlCol="0" anchor="ctr"/>
+          <a:lstStyle/>
+          <a:p>
+            <a:pPr algn="ctr"/>
+            <a:r>
+              <a:rPr lang="en-US" sz="733" dirty="0" err="1">
+                <a:solidFill>
+                  <a:schemeClr val="tx1"/>
+                </a:solidFill>
+              </a:rPr>
+              <a:t>plot_fish_absence_presence_vulnerability.Rmd</a:t>
+            </a:r>
+            <a:endParaRPr lang="en-US" sz="733" dirty="0">
+              <a:solidFill>
+                <a:schemeClr val="tx1"/>
+              </a:solidFill>
+            </a:endParaRPr>
+          </a:p>
+        </p:txBody>
+      </p:sp>
+      <p:cxnSp>
+        <p:nvCxnSpPr>
+          <p:cNvPr id="64" name="Straight Arrow Connector 63">
+            <a:extLst>
+              <a:ext uri="{FF2B5EF4-FFF2-40B4-BE49-F238E27FC236}">
+                <a16:creationId xmlns:a16="http://schemas.microsoft.com/office/drawing/2014/main" id="{BAB623A8-5FBC-8F56-A325-9B299BA2A83C}"/>
+              </a:ext>
+            </a:extLst>
+          </p:cNvPr>
+          <p:cNvCxnSpPr>
+            <a:cxnSpLocks/>
+            <a:stCxn id="17" idx="2"/>
+            <a:endCxn id="57" idx="0"/>
+          </p:cNvCxnSpPr>
+          <p:nvPr/>
+        </p:nvCxnSpPr>
+        <p:spPr>
+          <a:xfrm>
+            <a:off x="7718215" y="2930740"/>
+            <a:ext cx="1982019" cy="590992"/>
+          </a:xfrm>
+          <a:prstGeom prst="straightConnector1">
+            <a:avLst/>
+          </a:prstGeom>
+          <a:ln>
+            <a:tailEnd type="triangle"/>
+          </a:ln>
+        </p:spPr>
+        <p:style>
+          <a:lnRef idx="1">
+            <a:schemeClr val="accent1"/>
+          </a:lnRef>
+          <a:fillRef idx="0">
+            <a:schemeClr val="accent1"/>
+          </a:fillRef>
+          <a:effectRef idx="0">
+            <a:schemeClr val="accent1"/>
+          </a:effectRef>
+          <a:fontRef idx="minor">
+            <a:schemeClr val="tx1"/>
+          </a:fontRef>
+        </p:style>
+      </p:cxnSp>
+      <p:sp>
+        <p:nvSpPr>
+          <p:cNvPr id="66" name="Oval 65">
+            <a:extLst>
+              <a:ext uri="{FF2B5EF4-FFF2-40B4-BE49-F238E27FC236}">
+                <a16:creationId xmlns:a16="http://schemas.microsoft.com/office/drawing/2014/main" id="{B07B62E4-AEE4-791D-065E-4C3B39552552}"/>
+              </a:ext>
+            </a:extLst>
+          </p:cNvPr>
+          <p:cNvSpPr/>
+          <p:nvPr/>
+        </p:nvSpPr>
+        <p:spPr>
+          <a:xfrm>
+            <a:off x="9047057" y="3871016"/>
+            <a:ext cx="1429105" cy="365986"/>
+          </a:xfrm>
+          <a:prstGeom prst="ellipse">
+            <a:avLst/>
+          </a:prstGeom>
+          <a:solidFill>
+            <a:schemeClr val="bg1"/>
+          </a:solidFill>
+          <a:ln>
+            <a:solidFill>
+              <a:schemeClr val="accent4"/>
+            </a:solidFill>
+          </a:ln>
+        </p:spPr>
+        <p:style>
+          <a:lnRef idx="2">
+            <a:schemeClr val="accent1">
+              <a:shade val="50000"/>
+            </a:schemeClr>
+          </a:lnRef>
+          <a:fillRef idx="1">
+            <a:schemeClr val="accent1"/>
+          </a:fillRef>
+          <a:effectRef idx="0">
+            <a:schemeClr val="accent1"/>
+          </a:effectRef>
+          <a:fontRef idx="minor">
+            <a:schemeClr val="lt1"/>
+          </a:fontRef>
+        </p:style>
+        <p:txBody>
+          <a:bodyPr rtlCol="0" anchor="ctr"/>
+          <a:lstStyle/>
+          <a:p>
+            <a:pPr algn="ctr"/>
+            <a:r>
+              <a:rPr lang="en-US" sz="733" dirty="0">
+                <a:solidFill>
+                  <a:schemeClr val="tx1"/>
+                </a:solidFill>
+              </a:rPr>
+              <a:t>Figure_Vulnerability_ContWaterTemp.tiff.tiff</a:t>
+            </a:r>
+          </a:p>
+        </p:txBody>
+      </p:sp>
+      <p:sp>
+        <p:nvSpPr>
+          <p:cNvPr id="67" name="Rectangle: Rounded Corners 66">
+            <a:extLst>
+              <a:ext uri="{FF2B5EF4-FFF2-40B4-BE49-F238E27FC236}">
+                <a16:creationId xmlns:a16="http://schemas.microsoft.com/office/drawing/2014/main" id="{A2905E52-BF3E-4114-AF33-7368F884536A}"/>
+              </a:ext>
+            </a:extLst>
+          </p:cNvPr>
+          <p:cNvSpPr/>
+          <p:nvPr/>
+        </p:nvSpPr>
+        <p:spPr>
+          <a:xfrm>
+            <a:off x="10509589" y="3521732"/>
+            <a:ext cx="1306354" cy="261358"/>
+          </a:xfrm>
+          <a:prstGeom prst="roundRect">
+            <a:avLst/>
+          </a:prstGeom>
+          <a:solidFill>
+            <a:schemeClr val="bg1"/>
+          </a:solidFill>
+          <a:ln>
+            <a:solidFill>
+              <a:schemeClr val="accent2"/>
+            </a:solidFill>
+          </a:ln>
+        </p:spPr>
+        <p:style>
+          <a:lnRef idx="2">
+            <a:schemeClr val="accent1">
+              <a:shade val="50000"/>
+            </a:schemeClr>
+          </a:lnRef>
+          <a:fillRef idx="1">
+            <a:schemeClr val="accent1"/>
+          </a:fillRef>
+          <a:effectRef idx="0">
+            <a:schemeClr val="accent1"/>
+          </a:effectRef>
+          <a:fontRef idx="minor">
+            <a:schemeClr val="lt1"/>
+          </a:fontRef>
+        </p:style>
+        <p:txBody>
+          <a:bodyPr rtlCol="0" anchor="ctr"/>
+          <a:lstStyle/>
+          <a:p>
+            <a:pPr algn="ctr"/>
+            <a:r>
+              <a:rPr lang="en-US" sz="733" dirty="0" err="1">
+                <a:solidFill>
+                  <a:schemeClr val="tx1"/>
+                </a:solidFill>
+              </a:rPr>
+              <a:t>plot_days_exceedance_boxplot.Rmd</a:t>
+            </a:r>
+            <a:endParaRPr lang="en-US" sz="733" dirty="0">
+              <a:solidFill>
+                <a:schemeClr val="tx1"/>
+              </a:solidFill>
+            </a:endParaRPr>
+          </a:p>
+        </p:txBody>
+      </p:sp>
+      <p:cxnSp>
+        <p:nvCxnSpPr>
+          <p:cNvPr id="69" name="Straight Arrow Connector 68">
+            <a:extLst>
+              <a:ext uri="{FF2B5EF4-FFF2-40B4-BE49-F238E27FC236}">
+                <a16:creationId xmlns:a16="http://schemas.microsoft.com/office/drawing/2014/main" id="{31CAE819-8F12-DE38-14EE-DCED047AE169}"/>
+              </a:ext>
+            </a:extLst>
+          </p:cNvPr>
+          <p:cNvCxnSpPr>
+            <a:cxnSpLocks/>
+            <a:stCxn id="17" idx="2"/>
+          </p:cNvCxnSpPr>
+          <p:nvPr/>
+        </p:nvCxnSpPr>
+        <p:spPr>
+          <a:xfrm flipH="1">
+            <a:off x="7114954" y="2930740"/>
+            <a:ext cx="603262" cy="570209"/>
+          </a:xfrm>
+          <a:prstGeom prst="straightConnector1">
+            <a:avLst/>
+          </a:prstGeom>
+          <a:ln>
+            <a:tailEnd type="triangle"/>
+          </a:ln>
+        </p:spPr>
+        <p:style>
+          <a:lnRef idx="1">
+            <a:schemeClr val="accent1"/>
+          </a:lnRef>
+          <a:fillRef idx="0">
+            <a:schemeClr val="accent1"/>
+          </a:fillRef>
+          <a:effectRef idx="0">
+            <a:schemeClr val="accent1"/>
+          </a:effectRef>
+          <a:fontRef idx="minor">
+            <a:schemeClr val="tx1"/>
+          </a:fontRef>
+        </p:style>
+      </p:cxnSp>
+      <p:sp>
+        <p:nvSpPr>
+          <p:cNvPr id="72" name="Oval 71">
+            <a:extLst>
+              <a:ext uri="{FF2B5EF4-FFF2-40B4-BE49-F238E27FC236}">
+                <a16:creationId xmlns:a16="http://schemas.microsoft.com/office/drawing/2014/main" id="{462038FB-3F62-3261-D998-B1BBCF9FFCA9}"/>
+              </a:ext>
+            </a:extLst>
+          </p:cNvPr>
+          <p:cNvSpPr/>
+          <p:nvPr/>
+        </p:nvSpPr>
+        <p:spPr>
+          <a:xfrm>
+            <a:off x="10592420" y="3887932"/>
+            <a:ext cx="1160525" cy="365986"/>
+          </a:xfrm>
+          <a:prstGeom prst="ellipse">
+            <a:avLst/>
+          </a:prstGeom>
+          <a:solidFill>
+            <a:schemeClr val="bg1"/>
+          </a:solidFill>
+          <a:ln>
+            <a:solidFill>
+              <a:schemeClr val="accent4"/>
+            </a:solidFill>
+          </a:ln>
+        </p:spPr>
+        <p:style>
+          <a:lnRef idx="2">
+            <a:schemeClr val="accent1">
+              <a:shade val="50000"/>
+            </a:schemeClr>
+          </a:lnRef>
+          <a:fillRef idx="1">
+            <a:schemeClr val="accent1"/>
+          </a:fillRef>
+          <a:effectRef idx="0">
+            <a:schemeClr val="accent1"/>
+          </a:effectRef>
+          <a:fontRef idx="minor">
+            <a:schemeClr val="lt1"/>
+          </a:fontRef>
+        </p:style>
+        <p:txBody>
+          <a:bodyPr rtlCol="0" anchor="ctr"/>
+          <a:lstStyle/>
+          <a:p>
+            <a:pPr algn="ctr"/>
+            <a:r>
+              <a:rPr lang="en-US" sz="733" dirty="0">
+                <a:solidFill>
+                  <a:schemeClr val="tx1"/>
+                </a:solidFill>
+              </a:rPr>
+              <a:t>Figure_Opt_Tol_Upper.tiff</a:t>
+            </a:r>
+          </a:p>
+        </p:txBody>
+      </p:sp>
+      <p:cxnSp>
+        <p:nvCxnSpPr>
+          <p:cNvPr id="74" name="Straight Arrow Connector 73">
+            <a:extLst>
+              <a:ext uri="{FF2B5EF4-FFF2-40B4-BE49-F238E27FC236}">
+                <a16:creationId xmlns:a16="http://schemas.microsoft.com/office/drawing/2014/main" id="{E998677E-1689-FCEF-EC2A-E293E09806B7}"/>
+              </a:ext>
+            </a:extLst>
+          </p:cNvPr>
+          <p:cNvCxnSpPr>
+            <a:cxnSpLocks/>
+            <a:stCxn id="17" idx="2"/>
+            <a:endCxn id="67" idx="0"/>
+          </p:cNvCxnSpPr>
+          <p:nvPr/>
+        </p:nvCxnSpPr>
+        <p:spPr>
+          <a:xfrm>
+            <a:off x="7718215" y="2930740"/>
+            <a:ext cx="3444551" cy="590992"/>
+          </a:xfrm>
+          <a:prstGeom prst="straightConnector1">
+            <a:avLst/>
+          </a:prstGeom>
+          <a:ln>
+            <a:tailEnd type="triangle"/>
+          </a:ln>
+        </p:spPr>
+        <p:style>
+          <a:lnRef idx="1">
+            <a:schemeClr val="accent1"/>
+          </a:lnRef>
+          <a:fillRef idx="0">
+            <a:schemeClr val="accent1"/>
+          </a:fillRef>
+          <a:effectRef idx="0">
+            <a:schemeClr val="accent1"/>
+          </a:effectRef>
+          <a:fontRef idx="minor">
+            <a:schemeClr val="tx1"/>
+          </a:fontRef>
+        </p:style>
+      </p:cxnSp>
+      <p:cxnSp>
+        <p:nvCxnSpPr>
+          <p:cNvPr id="33" name="Straight Arrow Connector 32">
+            <a:extLst>
+              <a:ext uri="{FF2B5EF4-FFF2-40B4-BE49-F238E27FC236}">
+                <a16:creationId xmlns:a16="http://schemas.microsoft.com/office/drawing/2014/main" id="{CAF38A04-B553-4A41-1346-393B9D33A274}"/>
+              </a:ext>
+            </a:extLst>
+          </p:cNvPr>
+          <p:cNvCxnSpPr>
+            <a:cxnSpLocks/>
+            <a:stCxn id="20" idx="1"/>
+            <a:endCxn id="35" idx="0"/>
+          </p:cNvCxnSpPr>
+          <p:nvPr/>
+        </p:nvCxnSpPr>
+        <p:spPr>
+          <a:xfrm flipH="1">
+            <a:off x="3324832" y="2734049"/>
+            <a:ext cx="1574509" cy="750983"/>
+          </a:xfrm>
+          <a:prstGeom prst="straightConnector1">
+            <a:avLst/>
+          </a:prstGeom>
+          <a:ln>
+            <a:tailEnd type="triangle"/>
+          </a:ln>
+        </p:spPr>
+        <p:style>
+          <a:lnRef idx="1">
+            <a:schemeClr val="accent1"/>
+          </a:lnRef>
+          <a:fillRef idx="0">
+            <a:schemeClr val="accent1"/>
+          </a:fillRef>
+          <a:effectRef idx="0">
+            <a:schemeClr val="accent1"/>
+          </a:effectRef>
+          <a:fontRef idx="minor">
+            <a:schemeClr val="tx1"/>
+          </a:fontRef>
+        </p:style>
+      </p:cxnSp>
+      <p:sp>
+        <p:nvSpPr>
+          <p:cNvPr id="35" name="Rectangle: Rounded Corners 34">
+            <a:extLst>
+              <a:ext uri="{FF2B5EF4-FFF2-40B4-BE49-F238E27FC236}">
+                <a16:creationId xmlns:a16="http://schemas.microsoft.com/office/drawing/2014/main" id="{E307B05C-0027-6D23-3C73-52D64AA552E2}"/>
+              </a:ext>
+            </a:extLst>
+          </p:cNvPr>
+          <p:cNvSpPr/>
+          <p:nvPr/>
+        </p:nvSpPr>
+        <p:spPr>
+          <a:xfrm>
+            <a:off x="2615978" y="3485032"/>
+            <a:ext cx="1417708" cy="261358"/>
+          </a:xfrm>
+          <a:prstGeom prst="roundRect">
+            <a:avLst/>
+          </a:prstGeom>
+          <a:solidFill>
+            <a:schemeClr val="bg1"/>
+          </a:solidFill>
+          <a:ln>
+            <a:solidFill>
+              <a:schemeClr val="accent2"/>
+            </a:solidFill>
+          </a:ln>
+        </p:spPr>
+        <p:style>
+          <a:lnRef idx="2">
+            <a:schemeClr val="accent1">
+              <a:shade val="50000"/>
+            </a:schemeClr>
+          </a:lnRef>
+          <a:fillRef idx="1">
+            <a:schemeClr val="accent1"/>
+          </a:fillRef>
+          <a:effectRef idx="0">
+            <a:schemeClr val="accent1"/>
+          </a:effectRef>
+          <a:fontRef idx="minor">
+            <a:schemeClr val="lt1"/>
+          </a:fontRef>
+        </p:style>
+        <p:txBody>
+          <a:bodyPr rtlCol="0" anchor="ctr"/>
+          <a:lstStyle/>
+          <a:p>
+            <a:pPr algn="ctr"/>
+            <a:r>
+              <a:rPr lang="en-US" sz="733" dirty="0" err="1">
+                <a:solidFill>
+                  <a:schemeClr val="tx1"/>
+                </a:solidFill>
+              </a:rPr>
+              <a:t>model_temperature_trends.Rmd</a:t>
+            </a:r>
+            <a:endParaRPr lang="en-US" sz="733" dirty="0">
+              <a:solidFill>
+                <a:schemeClr val="tx1"/>
+              </a:solidFill>
+            </a:endParaRPr>
+          </a:p>
+        </p:txBody>
+      </p:sp>
+      <p:sp>
+        <p:nvSpPr>
+          <p:cNvPr id="38" name="Oval 37">
+            <a:extLst>
+              <a:ext uri="{FF2B5EF4-FFF2-40B4-BE49-F238E27FC236}">
+                <a16:creationId xmlns:a16="http://schemas.microsoft.com/office/drawing/2014/main" id="{14A0504C-5295-F109-97D0-712892757C3E}"/>
+              </a:ext>
+            </a:extLst>
+          </p:cNvPr>
+          <p:cNvSpPr/>
+          <p:nvPr/>
+        </p:nvSpPr>
+        <p:spPr>
+          <a:xfrm>
+            <a:off x="2570276" y="3920600"/>
+            <a:ext cx="1477018" cy="344597"/>
+          </a:xfrm>
+          <a:prstGeom prst="ellipse">
+            <a:avLst/>
+          </a:prstGeom>
+          <a:solidFill>
+            <a:schemeClr val="bg1"/>
+          </a:solidFill>
+          <a:ln>
+            <a:solidFill>
+              <a:schemeClr val="accent4"/>
+            </a:solidFill>
+          </a:ln>
+        </p:spPr>
+        <p:style>
+          <a:lnRef idx="2">
+            <a:schemeClr val="accent1">
+              <a:shade val="50000"/>
+            </a:schemeClr>
+          </a:lnRef>
+          <a:fillRef idx="1">
+            <a:schemeClr val="accent1"/>
+          </a:fillRef>
+          <a:effectRef idx="0">
+            <a:schemeClr val="accent1"/>
+          </a:effectRef>
+          <a:fontRef idx="minor">
+            <a:schemeClr val="lt1"/>
+          </a:fontRef>
+        </p:style>
+        <p:txBody>
+          <a:bodyPr rtlCol="0" anchor="ctr"/>
+          <a:lstStyle/>
+          <a:p>
+            <a:pPr algn="ctr"/>
+            <a:r>
+              <a:rPr lang="en-US" sz="733" dirty="0">
+                <a:solidFill>
+                  <a:schemeClr val="tx1"/>
+                </a:solidFill>
+              </a:rPr>
+              <a:t>Watertemp_trends_max3.png</a:t>
+            </a:r>
+          </a:p>
+        </p:txBody>
+      </p:sp>
+      <p:sp>
+        <p:nvSpPr>
+          <p:cNvPr id="44" name="Rectangle 43">
+            <a:extLst>
+              <a:ext uri="{FF2B5EF4-FFF2-40B4-BE49-F238E27FC236}">
+                <a16:creationId xmlns:a16="http://schemas.microsoft.com/office/drawing/2014/main" id="{83A23461-404F-0CCA-62A3-41B6B06CDA9E}"/>
+              </a:ext>
+            </a:extLst>
+          </p:cNvPr>
+          <p:cNvSpPr/>
+          <p:nvPr/>
+        </p:nvSpPr>
+        <p:spPr>
+          <a:xfrm>
+            <a:off x="8909454" y="2167011"/>
+            <a:ext cx="1618709" cy="740691"/>
+          </a:xfrm>
+          <a:prstGeom prst="rect">
+            <a:avLst/>
+          </a:prstGeom>
+          <a:solidFill>
+            <a:schemeClr val="bg1"/>
+          </a:solidFill>
+          <a:ln>
+            <a:solidFill>
+              <a:schemeClr val="accent3">
+                <a:lumMod val="75000"/>
+              </a:schemeClr>
+            </a:solidFill>
+          </a:ln>
+        </p:spPr>
+        <p:style>
+          <a:lnRef idx="2">
+            <a:schemeClr val="accent1">
+              <a:shade val="50000"/>
+            </a:schemeClr>
+          </a:lnRef>
+          <a:fillRef idx="1">
+            <a:schemeClr val="accent1"/>
+          </a:fillRef>
+          <a:effectRef idx="0">
+            <a:schemeClr val="accent1"/>
+          </a:effectRef>
+          <a:fontRef idx="minor">
+            <a:schemeClr val="lt1"/>
+          </a:fontRef>
+        </p:style>
+        <p:txBody>
+          <a:bodyPr rtlCol="0" anchor="ctr"/>
+          <a:lstStyle/>
+          <a:p>
+            <a:pPr marL="114306" indent="-114306" algn="ctr">
+              <a:buFont typeface="Arial" panose="020B0604020202020204" pitchFamily="34" charset="0"/>
+              <a:buChar char="•"/>
+            </a:pPr>
+            <a:r>
+              <a:rPr lang="en-US" sz="733" dirty="0">
+                <a:solidFill>
+                  <a:schemeClr val="tx1"/>
+                </a:solidFill>
+              </a:rPr>
+              <a:t>SpeciesThresholds.xlsx</a:t>
+            </a:r>
+          </a:p>
+          <a:p>
+            <a:pPr marL="114306" indent="-114306" algn="ctr">
+              <a:buFont typeface="Arial" panose="020B0604020202020204" pitchFamily="34" charset="0"/>
+              <a:buChar char="•"/>
+            </a:pPr>
+            <a:r>
+              <a:rPr lang="en-US" sz="733" dirty="0">
+                <a:solidFill>
+                  <a:schemeClr val="tx1"/>
+                </a:solidFill>
+              </a:rPr>
+              <a:t>Yolo Bypass EDI</a:t>
+            </a:r>
+          </a:p>
+          <a:p>
+            <a:pPr marL="114306" indent="-114306" algn="ctr">
+              <a:buFont typeface="Arial" panose="020B0604020202020204" pitchFamily="34" charset="0"/>
+              <a:buChar char="•"/>
+            </a:pPr>
+            <a:r>
+              <a:rPr lang="en-US" sz="733" dirty="0" err="1">
+                <a:solidFill>
+                  <a:schemeClr val="tx1"/>
+                </a:solidFill>
+              </a:rPr>
+              <a:t>deltafish</a:t>
+            </a:r>
+            <a:r>
+              <a:rPr lang="en-US" sz="733" dirty="0">
+                <a:solidFill>
+                  <a:schemeClr val="tx1"/>
+                </a:solidFill>
+              </a:rPr>
+              <a:t> package</a:t>
+            </a:r>
+          </a:p>
+          <a:p>
+            <a:pPr marL="114306" indent="-114306" algn="ctr">
+              <a:buFont typeface="Arial" panose="020B0604020202020204" pitchFamily="34" charset="0"/>
+              <a:buChar char="•"/>
+            </a:pPr>
+            <a:r>
+              <a:rPr lang="en-US" sz="733" dirty="0" err="1">
+                <a:solidFill>
+                  <a:schemeClr val="tx1"/>
+                </a:solidFill>
+              </a:rPr>
+              <a:t>salvage.rds</a:t>
+            </a:r>
+            <a:endParaRPr lang="en-US" sz="733" dirty="0">
+              <a:solidFill>
+                <a:schemeClr val="tx1"/>
+              </a:solidFill>
+            </a:endParaRPr>
+          </a:p>
+          <a:p>
+            <a:pPr marL="114306" indent="-114306" algn="ctr">
+              <a:buFont typeface="Arial" panose="020B0604020202020204" pitchFamily="34" charset="0"/>
+              <a:buChar char="•"/>
+            </a:pPr>
+            <a:r>
+              <a:rPr lang="en-US" sz="733" dirty="0">
+                <a:solidFill>
+                  <a:schemeClr val="tx1"/>
+                </a:solidFill>
+              </a:rPr>
+              <a:t>Sturgeon_Individuals.csv</a:t>
+            </a:r>
+          </a:p>
+        </p:txBody>
+      </p:sp>
+      <p:cxnSp>
+        <p:nvCxnSpPr>
+          <p:cNvPr id="45" name="Straight Arrow Connector 44">
+            <a:extLst>
+              <a:ext uri="{FF2B5EF4-FFF2-40B4-BE49-F238E27FC236}">
+                <a16:creationId xmlns:a16="http://schemas.microsoft.com/office/drawing/2014/main" id="{D788AE69-B8A1-32C0-467C-7C2178B23EC8}"/>
+              </a:ext>
+            </a:extLst>
+          </p:cNvPr>
+          <p:cNvCxnSpPr>
+            <a:cxnSpLocks/>
+            <a:stCxn id="44" idx="2"/>
+            <a:endCxn id="57" idx="0"/>
+          </p:cNvCxnSpPr>
+          <p:nvPr/>
+        </p:nvCxnSpPr>
+        <p:spPr>
+          <a:xfrm flipH="1">
+            <a:off x="9700234" y="2907701"/>
+            <a:ext cx="18574" cy="614031"/>
+          </a:xfrm>
+          <a:prstGeom prst="straightConnector1">
+            <a:avLst/>
+          </a:prstGeom>
+          <a:ln>
+            <a:tailEnd type="triangle"/>
+          </a:ln>
+        </p:spPr>
+        <p:style>
+          <a:lnRef idx="1">
+            <a:schemeClr val="accent1"/>
+          </a:lnRef>
+          <a:fillRef idx="0">
+            <a:schemeClr val="accent1"/>
+          </a:fillRef>
+          <a:effectRef idx="0">
+            <a:schemeClr val="accent1"/>
+          </a:effectRef>
+          <a:fontRef idx="minor">
+            <a:schemeClr val="tx1"/>
+          </a:fontRef>
+        </p:style>
+      </p:cxnSp>
+      <p:sp>
+        <p:nvSpPr>
+          <p:cNvPr id="43" name="Rectangle: Rounded Corners 42">
+            <a:extLst>
+              <a:ext uri="{FF2B5EF4-FFF2-40B4-BE49-F238E27FC236}">
+                <a16:creationId xmlns:a16="http://schemas.microsoft.com/office/drawing/2014/main" id="{E0857E85-317A-64C3-B983-96AE7DF7FB7D}"/>
+              </a:ext>
+            </a:extLst>
+          </p:cNvPr>
+          <p:cNvSpPr/>
+          <p:nvPr/>
+        </p:nvSpPr>
+        <p:spPr>
+          <a:xfrm>
+            <a:off x="6908861" y="1526925"/>
+            <a:ext cx="1193666" cy="261358"/>
+          </a:xfrm>
+          <a:prstGeom prst="roundRect">
+            <a:avLst/>
+          </a:prstGeom>
+          <a:solidFill>
+            <a:schemeClr val="bg1"/>
+          </a:solidFill>
+          <a:ln>
+            <a:solidFill>
+              <a:schemeClr val="accent2"/>
+            </a:solidFill>
+          </a:ln>
+        </p:spPr>
+        <p:style>
+          <a:lnRef idx="2">
+            <a:schemeClr val="accent1">
+              <a:shade val="50000"/>
+            </a:schemeClr>
+          </a:lnRef>
+          <a:fillRef idx="1">
+            <a:schemeClr val="accent1"/>
+          </a:fillRef>
+          <a:effectRef idx="0">
+            <a:schemeClr val="accent1"/>
+          </a:effectRef>
+          <a:fontRef idx="minor">
+            <a:schemeClr val="lt1"/>
+          </a:fontRef>
+        </p:style>
+        <p:txBody>
+          <a:bodyPr rtlCol="0" anchor="ctr"/>
+          <a:lstStyle/>
+          <a:p>
+            <a:pPr algn="ctr"/>
+            <a:r>
+              <a:rPr lang="en-US" sz="733" dirty="0" err="1">
+                <a:solidFill>
+                  <a:schemeClr val="tx1"/>
+                </a:solidFill>
+              </a:rPr>
+              <a:t>join_stations_to_regions.R</a:t>
+            </a:r>
+            <a:endParaRPr lang="en-US" sz="733" dirty="0">
+              <a:solidFill>
+                <a:schemeClr val="tx1"/>
+              </a:solidFill>
+            </a:endParaRPr>
+          </a:p>
+        </p:txBody>
+      </p:sp>
+      <p:cxnSp>
+        <p:nvCxnSpPr>
+          <p:cNvPr id="46" name="Straight Arrow Connector 45">
+            <a:extLst>
+              <a:ext uri="{FF2B5EF4-FFF2-40B4-BE49-F238E27FC236}">
+                <a16:creationId xmlns:a16="http://schemas.microsoft.com/office/drawing/2014/main" id="{067925DE-35FB-AB6F-81F2-208DD8053A71}"/>
+              </a:ext>
+            </a:extLst>
+          </p:cNvPr>
+          <p:cNvCxnSpPr>
+            <a:cxnSpLocks/>
+            <a:stCxn id="43" idx="1"/>
+            <a:endCxn id="18" idx="3"/>
+          </p:cNvCxnSpPr>
+          <p:nvPr/>
+        </p:nvCxnSpPr>
+        <p:spPr>
+          <a:xfrm flipH="1">
+            <a:off x="6704928" y="1657604"/>
+            <a:ext cx="203933" cy="212478"/>
+          </a:xfrm>
+          <a:prstGeom prst="straightConnector1">
+            <a:avLst/>
+          </a:prstGeom>
+          <a:ln>
+            <a:tailEnd type="triangle"/>
+          </a:ln>
+        </p:spPr>
+        <p:style>
+          <a:lnRef idx="1">
+            <a:schemeClr val="accent1"/>
+          </a:lnRef>
+          <a:fillRef idx="0">
+            <a:schemeClr val="accent1"/>
+          </a:fillRef>
+          <a:effectRef idx="0">
+            <a:schemeClr val="accent1"/>
+          </a:effectRef>
+          <a:fontRef idx="minor">
+            <a:schemeClr val="tx1"/>
+          </a:fontRef>
+        </p:style>
+      </p:cxnSp>
+      <p:sp>
+        <p:nvSpPr>
+          <p:cNvPr id="23" name="TextBox 22">
+            <a:extLst>
+              <a:ext uri="{FF2B5EF4-FFF2-40B4-BE49-F238E27FC236}">
+                <a16:creationId xmlns:a16="http://schemas.microsoft.com/office/drawing/2014/main" id="{F9BAE556-25F7-2237-1D71-D7BEF6073B0C}"/>
+              </a:ext>
+            </a:extLst>
+          </p:cNvPr>
+          <p:cNvSpPr txBox="1"/>
+          <p:nvPr/>
+        </p:nvSpPr>
+        <p:spPr>
+          <a:xfrm>
+            <a:off x="182881" y="5468779"/>
+            <a:ext cx="966931" cy="276999"/>
+          </a:xfrm>
+          <a:prstGeom prst="rect">
+            <a:avLst/>
+          </a:prstGeom>
+          <a:noFill/>
+        </p:spPr>
+        <p:txBody>
+          <a:bodyPr wrap="none" rtlCol="0">
+            <a:spAutoFit/>
+          </a:bodyPr>
+          <a:lstStyle/>
+          <a:p>
+            <a:r>
+              <a:rPr lang="en-US" sz="1200" dirty="0"/>
+              <a:t>As </a:t>
+            </a:r>
+            <a:r>
+              <a:rPr lang="en-US" sz="1200"/>
+              <a:t>of 2/5/25</a:t>
+            </a:r>
+            <a:endParaRPr lang="en-US" sz="1200" dirty="0"/>
+          </a:p>
+        </p:txBody>
+      </p:sp>
+      <p:sp>
+        <p:nvSpPr>
+          <p:cNvPr id="52" name="Rectangle 51">
+            <a:extLst>
+              <a:ext uri="{FF2B5EF4-FFF2-40B4-BE49-F238E27FC236}">
+                <a16:creationId xmlns:a16="http://schemas.microsoft.com/office/drawing/2014/main" id="{8296EAC4-F0CB-FC82-8CD9-4F4113DCC984}"/>
+              </a:ext>
+            </a:extLst>
+          </p:cNvPr>
+          <p:cNvSpPr/>
+          <p:nvPr/>
+        </p:nvSpPr>
+        <p:spPr>
+          <a:xfrm>
+            <a:off x="6313263" y="691114"/>
+            <a:ext cx="1192886" cy="215099"/>
+          </a:xfrm>
+          <a:prstGeom prst="rect">
+            <a:avLst/>
+          </a:prstGeom>
+          <a:solidFill>
+            <a:schemeClr val="bg1"/>
+          </a:solidFill>
+          <a:ln>
+            <a:solidFill>
+              <a:schemeClr val="accent3">
+                <a:lumMod val="75000"/>
+              </a:schemeClr>
+            </a:solidFill>
+          </a:ln>
+        </p:spPr>
+        <p:style>
+          <a:lnRef idx="2">
+            <a:schemeClr val="accent1">
+              <a:shade val="50000"/>
+            </a:schemeClr>
+          </a:lnRef>
+          <a:fillRef idx="1">
+            <a:schemeClr val="accent1"/>
+          </a:fillRef>
+          <a:effectRef idx="0">
+            <a:schemeClr val="accent1"/>
+          </a:effectRef>
+          <a:fontRef idx="minor">
+            <a:schemeClr val="lt1"/>
+          </a:fontRef>
+        </p:style>
+        <p:txBody>
+          <a:bodyPr rtlCol="0" anchor="ctr"/>
+          <a:lstStyle/>
+          <a:p>
+            <a:pPr algn="ctr"/>
+            <a:r>
+              <a:rPr lang="en-US" sz="733" dirty="0">
+                <a:solidFill>
+                  <a:schemeClr val="tx1"/>
+                </a:solidFill>
+              </a:rPr>
+              <a:t>StationsMetadata.csv</a:t>
+            </a:r>
+          </a:p>
+        </p:txBody>
+      </p:sp>
+      <p:sp>
+        <p:nvSpPr>
+          <p:cNvPr id="54" name="Rectangle 53">
+            <a:extLst>
+              <a:ext uri="{FF2B5EF4-FFF2-40B4-BE49-F238E27FC236}">
+                <a16:creationId xmlns:a16="http://schemas.microsoft.com/office/drawing/2014/main" id="{E20E38AF-34DE-65EA-6359-1AFE49F15F78}"/>
+              </a:ext>
+            </a:extLst>
+          </p:cNvPr>
+          <p:cNvSpPr/>
+          <p:nvPr/>
+        </p:nvSpPr>
+        <p:spPr>
+          <a:xfrm>
+            <a:off x="4804287" y="666841"/>
+            <a:ext cx="1294357" cy="230921"/>
+          </a:xfrm>
+          <a:prstGeom prst="rect">
+            <a:avLst/>
+          </a:prstGeom>
+          <a:solidFill>
+            <a:schemeClr val="bg1"/>
+          </a:solidFill>
+          <a:ln>
+            <a:solidFill>
+              <a:schemeClr val="accent3">
+                <a:lumMod val="75000"/>
+              </a:schemeClr>
+            </a:solidFill>
+          </a:ln>
+        </p:spPr>
+        <p:style>
+          <a:lnRef idx="2">
+            <a:schemeClr val="accent1">
+              <a:shade val="50000"/>
+            </a:schemeClr>
+          </a:lnRef>
+          <a:fillRef idx="1">
+            <a:schemeClr val="accent1"/>
+          </a:fillRef>
+          <a:effectRef idx="0">
+            <a:schemeClr val="accent1"/>
+          </a:effectRef>
+          <a:fontRef idx="minor">
+            <a:schemeClr val="lt1"/>
+          </a:fontRef>
+        </p:style>
+        <p:txBody>
+          <a:bodyPr rtlCol="0" anchor="ctr"/>
+          <a:lstStyle/>
+          <a:p>
+            <a:pPr algn="ctr"/>
+            <a:r>
+              <a:rPr lang="en-US" sz="733" dirty="0" err="1">
+                <a:solidFill>
+                  <a:schemeClr val="tx1"/>
+                </a:solidFill>
+              </a:rPr>
+              <a:t>Rosies_regions_edited.shp</a:t>
+            </a:r>
+            <a:endParaRPr lang="en-US" sz="733" dirty="0">
+              <a:solidFill>
+                <a:schemeClr val="tx1"/>
+              </a:solidFill>
+            </a:endParaRPr>
+          </a:p>
+        </p:txBody>
+      </p:sp>
+      <p:cxnSp>
+        <p:nvCxnSpPr>
+          <p:cNvPr id="55" name="Straight Arrow Connector 54">
+            <a:extLst>
+              <a:ext uri="{FF2B5EF4-FFF2-40B4-BE49-F238E27FC236}">
+                <a16:creationId xmlns:a16="http://schemas.microsoft.com/office/drawing/2014/main" id="{2017E878-9C6F-2224-E73B-63D940E92C73}"/>
+              </a:ext>
+            </a:extLst>
+          </p:cNvPr>
+          <p:cNvCxnSpPr>
+            <a:cxnSpLocks/>
+            <a:stCxn id="54" idx="2"/>
+            <a:endCxn id="43" idx="0"/>
+          </p:cNvCxnSpPr>
+          <p:nvPr/>
+        </p:nvCxnSpPr>
+        <p:spPr>
+          <a:xfrm>
+            <a:off x="5451466" y="897762"/>
+            <a:ext cx="2054228" cy="629163"/>
+          </a:xfrm>
+          <a:prstGeom prst="straightConnector1">
+            <a:avLst/>
+          </a:prstGeom>
+          <a:ln>
+            <a:tailEnd type="triangle"/>
+          </a:ln>
+        </p:spPr>
+        <p:style>
+          <a:lnRef idx="1">
+            <a:schemeClr val="accent1"/>
+          </a:lnRef>
+          <a:fillRef idx="0">
+            <a:schemeClr val="accent1"/>
+          </a:fillRef>
+          <a:effectRef idx="0">
+            <a:schemeClr val="accent1"/>
+          </a:effectRef>
+          <a:fontRef idx="minor">
+            <a:schemeClr val="tx1"/>
+          </a:fontRef>
+        </p:style>
+      </p:cxnSp>
+      <p:cxnSp>
+        <p:nvCxnSpPr>
+          <p:cNvPr id="58" name="Straight Arrow Connector 57">
+            <a:extLst>
+              <a:ext uri="{FF2B5EF4-FFF2-40B4-BE49-F238E27FC236}">
+                <a16:creationId xmlns:a16="http://schemas.microsoft.com/office/drawing/2014/main" id="{4215B746-5646-13A1-0785-5D3971BF632E}"/>
+              </a:ext>
+            </a:extLst>
+          </p:cNvPr>
+          <p:cNvCxnSpPr>
+            <a:cxnSpLocks/>
+            <a:stCxn id="52" idx="2"/>
+            <a:endCxn id="43" idx="0"/>
+          </p:cNvCxnSpPr>
+          <p:nvPr/>
+        </p:nvCxnSpPr>
+        <p:spPr>
+          <a:xfrm>
+            <a:off x="6909706" y="906213"/>
+            <a:ext cx="595988" cy="620712"/>
+          </a:xfrm>
+          <a:prstGeom prst="straightConnector1">
+            <a:avLst/>
+          </a:prstGeom>
+          <a:ln>
+            <a:tailEnd type="triangle"/>
+          </a:ln>
+        </p:spPr>
+        <p:style>
+          <a:lnRef idx="1">
+            <a:schemeClr val="accent1"/>
+          </a:lnRef>
+          <a:fillRef idx="0">
+            <a:schemeClr val="accent1"/>
+          </a:fillRef>
+          <a:effectRef idx="0">
+            <a:schemeClr val="accent1"/>
+          </a:effectRef>
+          <a:fontRef idx="minor">
+            <a:schemeClr val="tx1"/>
+          </a:fontRef>
+        </p:style>
+      </p:cxnSp>
+      <p:sp>
+        <p:nvSpPr>
+          <p:cNvPr id="50" name="Oval 49">
+            <a:extLst>
+              <a:ext uri="{FF2B5EF4-FFF2-40B4-BE49-F238E27FC236}">
+                <a16:creationId xmlns:a16="http://schemas.microsoft.com/office/drawing/2014/main" id="{03FD0A01-912F-0AB3-D5E9-616D3326779A}"/>
+              </a:ext>
+            </a:extLst>
+          </p:cNvPr>
+          <p:cNvSpPr/>
+          <p:nvPr/>
+        </p:nvSpPr>
+        <p:spPr>
+          <a:xfrm>
+            <a:off x="7763158" y="3833012"/>
+            <a:ext cx="1193666" cy="471025"/>
+          </a:xfrm>
+          <a:prstGeom prst="ellipse">
+            <a:avLst/>
+          </a:prstGeom>
+          <a:solidFill>
+            <a:schemeClr val="bg1"/>
+          </a:solidFill>
+          <a:ln>
+            <a:solidFill>
+              <a:schemeClr val="accent4"/>
+            </a:solidFill>
+          </a:ln>
+        </p:spPr>
+        <p:style>
+          <a:lnRef idx="2">
+            <a:schemeClr val="accent1">
+              <a:shade val="50000"/>
+            </a:schemeClr>
+          </a:lnRef>
+          <a:fillRef idx="1">
+            <a:schemeClr val="accent1"/>
+          </a:fillRef>
+          <a:effectRef idx="0">
+            <a:schemeClr val="accent1"/>
+          </a:effectRef>
+          <a:fontRef idx="minor">
+            <a:schemeClr val="lt1"/>
+          </a:fontRef>
+        </p:style>
+        <p:txBody>
+          <a:bodyPr rtlCol="0" anchor="ctr"/>
+          <a:lstStyle/>
+          <a:p>
+            <a:pPr algn="ctr"/>
+            <a:r>
+              <a:rPr lang="en-US" sz="733" dirty="0">
+                <a:solidFill>
+                  <a:schemeClr val="tx1"/>
+                </a:solidFill>
+              </a:rPr>
+              <a:t>Figure_Regional_interannual_variance.png</a:t>
+            </a:r>
+          </a:p>
+        </p:txBody>
+      </p:sp>
+      <p:sp>
+        <p:nvSpPr>
+          <p:cNvPr id="51" name="Oval 50">
+            <a:extLst>
+              <a:ext uri="{FF2B5EF4-FFF2-40B4-BE49-F238E27FC236}">
+                <a16:creationId xmlns:a16="http://schemas.microsoft.com/office/drawing/2014/main" id="{1F6F6862-6D90-721D-3361-668B6DA3C079}"/>
+              </a:ext>
+            </a:extLst>
+          </p:cNvPr>
+          <p:cNvSpPr/>
+          <p:nvPr/>
+        </p:nvSpPr>
+        <p:spPr>
+          <a:xfrm>
+            <a:off x="2570276" y="4290215"/>
+            <a:ext cx="1477018" cy="344597"/>
+          </a:xfrm>
+          <a:prstGeom prst="ellipse">
+            <a:avLst/>
+          </a:prstGeom>
+          <a:solidFill>
+            <a:schemeClr val="bg1"/>
+          </a:solidFill>
+          <a:ln>
+            <a:solidFill>
+              <a:schemeClr val="accent4"/>
+            </a:solidFill>
+          </a:ln>
+        </p:spPr>
+        <p:style>
+          <a:lnRef idx="2">
+            <a:schemeClr val="accent1">
+              <a:shade val="50000"/>
+            </a:schemeClr>
+          </a:lnRef>
+          <a:fillRef idx="1">
+            <a:schemeClr val="accent1"/>
+          </a:fillRef>
+          <a:effectRef idx="0">
+            <a:schemeClr val="accent1"/>
+          </a:effectRef>
+          <a:fontRef idx="minor">
+            <a:schemeClr val="lt1"/>
+          </a:fontRef>
+        </p:style>
+        <p:txBody>
+          <a:bodyPr rtlCol="0" anchor="ctr"/>
+          <a:lstStyle/>
+          <a:p>
+            <a:pPr algn="ctr"/>
+            <a:r>
+              <a:rPr lang="en-US" sz="733" dirty="0">
+                <a:solidFill>
+                  <a:schemeClr val="tx1"/>
+                </a:solidFill>
+              </a:rPr>
+              <a:t>Range_plot.png</a:t>
+            </a:r>
+          </a:p>
+        </p:txBody>
+      </p:sp>
+      <p:sp>
+        <p:nvSpPr>
+          <p:cNvPr id="56" name="Oval 55">
+            <a:extLst>
+              <a:ext uri="{FF2B5EF4-FFF2-40B4-BE49-F238E27FC236}">
+                <a16:creationId xmlns:a16="http://schemas.microsoft.com/office/drawing/2014/main" id="{DA4F74EE-A99E-FA68-D260-8BCED4E7C2DA}"/>
+              </a:ext>
+            </a:extLst>
+          </p:cNvPr>
+          <p:cNvSpPr/>
+          <p:nvPr/>
+        </p:nvSpPr>
+        <p:spPr>
+          <a:xfrm>
+            <a:off x="2508157" y="4701255"/>
+            <a:ext cx="1477018" cy="344597"/>
+          </a:xfrm>
+          <a:prstGeom prst="ellipse">
+            <a:avLst/>
+          </a:prstGeom>
+          <a:solidFill>
+            <a:schemeClr val="bg1"/>
+          </a:solidFill>
+          <a:ln>
+            <a:solidFill>
+              <a:srgbClr val="00B050"/>
+            </a:solidFill>
+          </a:ln>
+        </p:spPr>
+        <p:style>
+          <a:lnRef idx="2">
+            <a:schemeClr val="accent1">
+              <a:shade val="50000"/>
+            </a:schemeClr>
+          </a:lnRef>
+          <a:fillRef idx="1">
+            <a:schemeClr val="accent1"/>
+          </a:fillRef>
+          <a:effectRef idx="0">
+            <a:schemeClr val="accent1"/>
+          </a:effectRef>
+          <a:fontRef idx="minor">
+            <a:schemeClr val="lt1"/>
+          </a:fontRef>
+        </p:style>
+        <p:txBody>
+          <a:bodyPr rtlCol="0" anchor="ctr"/>
+          <a:lstStyle/>
+          <a:p>
+            <a:pPr algn="ctr"/>
+            <a:r>
+              <a:rPr lang="en-US" sz="733" dirty="0">
+                <a:solidFill>
+                  <a:schemeClr val="tx1"/>
+                </a:solidFill>
+              </a:rPr>
+              <a:t>Table A1: Stations_included_10year.csv</a:t>
+            </a:r>
+          </a:p>
+        </p:txBody>
+      </p:sp>
+      <p:sp>
+        <p:nvSpPr>
+          <p:cNvPr id="2" name="Oval 1">
+            <a:extLst>
+              <a:ext uri="{FF2B5EF4-FFF2-40B4-BE49-F238E27FC236}">
+                <a16:creationId xmlns:a16="http://schemas.microsoft.com/office/drawing/2014/main" id="{46120BBC-4738-4D84-257D-A4670AC939E5}"/>
+              </a:ext>
+            </a:extLst>
+          </p:cNvPr>
+          <p:cNvSpPr/>
+          <p:nvPr/>
+        </p:nvSpPr>
+        <p:spPr>
+          <a:xfrm>
+            <a:off x="9030694" y="4336258"/>
+            <a:ext cx="1477018" cy="344597"/>
+          </a:xfrm>
+          <a:prstGeom prst="ellipse">
+            <a:avLst/>
+          </a:prstGeom>
+          <a:solidFill>
+            <a:schemeClr val="bg1"/>
+          </a:solidFill>
+          <a:ln>
+            <a:solidFill>
+              <a:srgbClr val="00B050"/>
+            </a:solidFill>
+          </a:ln>
+        </p:spPr>
+        <p:style>
+          <a:lnRef idx="2">
+            <a:schemeClr val="accent1">
+              <a:shade val="50000"/>
+            </a:schemeClr>
+          </a:lnRef>
+          <a:fillRef idx="1">
+            <a:schemeClr val="accent1"/>
+          </a:fillRef>
+          <a:effectRef idx="0">
+            <a:schemeClr val="accent1"/>
+          </a:effectRef>
+          <a:fontRef idx="minor">
+            <a:schemeClr val="lt1"/>
+          </a:fontRef>
+        </p:style>
+        <p:txBody>
+          <a:bodyPr rtlCol="0" anchor="ctr"/>
+          <a:lstStyle/>
+          <a:p>
+            <a:pPr algn="ctr"/>
+            <a:r>
+              <a:rPr lang="en-US" sz="733" dirty="0">
+                <a:solidFill>
+                  <a:schemeClr val="tx1"/>
+                </a:solidFill>
+              </a:rPr>
+              <a:t>surveymaxtemps.csv</a:t>
+            </a:r>
+          </a:p>
+        </p:txBody>
+      </p:sp>
+      <p:sp>
+        <p:nvSpPr>
+          <p:cNvPr id="3" name="Oval 2">
+            <a:extLst>
+              <a:ext uri="{FF2B5EF4-FFF2-40B4-BE49-F238E27FC236}">
+                <a16:creationId xmlns:a16="http://schemas.microsoft.com/office/drawing/2014/main" id="{73ED4015-FED2-7FCD-6102-087493D4B739}"/>
+              </a:ext>
+            </a:extLst>
+          </p:cNvPr>
+          <p:cNvSpPr/>
+          <p:nvPr/>
+        </p:nvSpPr>
+        <p:spPr>
+          <a:xfrm>
+            <a:off x="10592420" y="4358760"/>
+            <a:ext cx="1477018" cy="344597"/>
+          </a:xfrm>
+          <a:prstGeom prst="ellipse">
+            <a:avLst/>
+          </a:prstGeom>
+          <a:solidFill>
+            <a:schemeClr val="bg1"/>
+          </a:solidFill>
+          <a:ln>
+            <a:solidFill>
+              <a:srgbClr val="00B050"/>
+            </a:solidFill>
+          </a:ln>
+        </p:spPr>
+        <p:style>
+          <a:lnRef idx="2">
+            <a:schemeClr val="accent1">
+              <a:shade val="50000"/>
+            </a:schemeClr>
+          </a:lnRef>
+          <a:fillRef idx="1">
+            <a:schemeClr val="accent1"/>
+          </a:fillRef>
+          <a:effectRef idx="0">
+            <a:schemeClr val="accent1"/>
+          </a:effectRef>
+          <a:fontRef idx="minor">
+            <a:schemeClr val="lt1"/>
+          </a:fontRef>
+        </p:style>
+        <p:txBody>
+          <a:bodyPr rtlCol="0" anchor="ctr"/>
+          <a:lstStyle/>
+          <a:p>
+            <a:pPr algn="ctr"/>
+            <a:r>
+              <a:rPr lang="en-US" sz="733" dirty="0">
+                <a:solidFill>
+                  <a:schemeClr val="tx1"/>
+                </a:solidFill>
+              </a:rPr>
+              <a:t>Appendix B: Table_AppendixB.csv</a:t>
+            </a:r>
+          </a:p>
+        </p:txBody>
+      </p:sp>
+      <p:sp>
+        <p:nvSpPr>
+          <p:cNvPr id="5" name="Oval 4">
+            <a:extLst>
+              <a:ext uri="{FF2B5EF4-FFF2-40B4-BE49-F238E27FC236}">
+                <a16:creationId xmlns:a16="http://schemas.microsoft.com/office/drawing/2014/main" id="{6D3914DB-7D14-9E0F-5E00-8FE3C3124597}"/>
+              </a:ext>
+            </a:extLst>
+          </p:cNvPr>
+          <p:cNvSpPr/>
+          <p:nvPr/>
+        </p:nvSpPr>
+        <p:spPr>
+          <a:xfrm>
+            <a:off x="2155198" y="2052564"/>
+            <a:ext cx="1477018" cy="344597"/>
+          </a:xfrm>
+          <a:prstGeom prst="ellipse">
+            <a:avLst/>
+          </a:prstGeom>
+          <a:solidFill>
+            <a:schemeClr val="bg1"/>
+          </a:solidFill>
+          <a:ln>
+            <a:solidFill>
+              <a:schemeClr val="accent4"/>
+            </a:solidFill>
+          </a:ln>
+        </p:spPr>
+        <p:style>
+          <a:lnRef idx="2">
+            <a:schemeClr val="accent1">
+              <a:shade val="50000"/>
+            </a:schemeClr>
+          </a:lnRef>
+          <a:fillRef idx="1">
+            <a:schemeClr val="accent1"/>
+          </a:fillRef>
+          <a:effectRef idx="0">
+            <a:schemeClr val="accent1"/>
+          </a:effectRef>
+          <a:fontRef idx="minor">
+            <a:schemeClr val="lt1"/>
+          </a:fontRef>
+        </p:style>
+        <p:txBody>
+          <a:bodyPr rtlCol="0" anchor="ctr"/>
+          <a:lstStyle/>
+          <a:p>
+            <a:pPr algn="ctr"/>
+            <a:r>
+              <a:rPr lang="en-US" sz="733" dirty="0">
+                <a:solidFill>
+                  <a:schemeClr val="tx1"/>
+                </a:solidFill>
+              </a:rPr>
+              <a:t>station_map.png</a:t>
+            </a:r>
+          </a:p>
+        </p:txBody>
+      </p:sp>
+      <p:sp>
+        <p:nvSpPr>
+          <p:cNvPr id="7" name="Rectangle 6">
+            <a:extLst>
+              <a:ext uri="{FF2B5EF4-FFF2-40B4-BE49-F238E27FC236}">
+                <a16:creationId xmlns:a16="http://schemas.microsoft.com/office/drawing/2014/main" id="{FC89EE67-0FC0-FD2A-C371-768FA62E554D}"/>
+              </a:ext>
+            </a:extLst>
+          </p:cNvPr>
+          <p:cNvSpPr/>
+          <p:nvPr/>
+        </p:nvSpPr>
+        <p:spPr>
+          <a:xfrm>
+            <a:off x="10528163" y="4829588"/>
+            <a:ext cx="1618709" cy="393383"/>
+          </a:xfrm>
+          <a:prstGeom prst="rect">
+            <a:avLst/>
+          </a:prstGeom>
+          <a:solidFill>
+            <a:schemeClr val="bg1"/>
+          </a:solidFill>
+          <a:ln>
+            <a:solidFill>
+              <a:schemeClr val="accent3">
+                <a:lumMod val="75000"/>
+              </a:schemeClr>
+            </a:solidFill>
+          </a:ln>
+        </p:spPr>
+        <p:style>
+          <a:lnRef idx="2">
+            <a:schemeClr val="accent1">
+              <a:shade val="50000"/>
+            </a:schemeClr>
+          </a:lnRef>
+          <a:fillRef idx="1">
+            <a:schemeClr val="accent1"/>
+          </a:fillRef>
+          <a:effectRef idx="0">
+            <a:schemeClr val="accent1"/>
+          </a:effectRef>
+          <a:fontRef idx="minor">
+            <a:schemeClr val="lt1"/>
+          </a:fontRef>
+        </p:style>
+        <p:txBody>
+          <a:bodyPr rtlCol="0" anchor="ctr"/>
+          <a:lstStyle/>
+          <a:p>
+            <a:pPr algn="ctr"/>
+            <a:r>
+              <a:rPr lang="en-US" sz="733" dirty="0">
+                <a:solidFill>
+                  <a:schemeClr val="tx1"/>
+                </a:solidFill>
+              </a:rPr>
+              <a:t>daysExceedanceDataForplotting.csv</a:t>
+            </a:r>
+          </a:p>
+        </p:txBody>
+      </p:sp>
+      <p:cxnSp>
+        <p:nvCxnSpPr>
+          <p:cNvPr id="8" name="Straight Arrow Connector 7">
+            <a:extLst>
+              <a:ext uri="{FF2B5EF4-FFF2-40B4-BE49-F238E27FC236}">
+                <a16:creationId xmlns:a16="http://schemas.microsoft.com/office/drawing/2014/main" id="{4749C34C-14D8-B48D-9941-63635F21F878}"/>
+              </a:ext>
+            </a:extLst>
+          </p:cNvPr>
+          <p:cNvCxnSpPr>
+            <a:cxnSpLocks/>
+            <a:stCxn id="7" idx="2"/>
+            <a:endCxn id="41" idx="0"/>
+          </p:cNvCxnSpPr>
+          <p:nvPr/>
+        </p:nvCxnSpPr>
+        <p:spPr>
+          <a:xfrm flipH="1">
+            <a:off x="10476162" y="5222971"/>
+            <a:ext cx="861356" cy="203396"/>
+          </a:xfrm>
+          <a:prstGeom prst="straightConnector1">
+            <a:avLst/>
+          </a:prstGeom>
+          <a:ln>
+            <a:tailEnd type="triangle"/>
+          </a:ln>
+        </p:spPr>
+        <p:style>
+          <a:lnRef idx="1">
+            <a:schemeClr val="accent1"/>
+          </a:lnRef>
+          <a:fillRef idx="0">
+            <a:schemeClr val="accent1"/>
+          </a:fillRef>
+          <a:effectRef idx="0">
+            <a:schemeClr val="accent1"/>
+          </a:effectRef>
+          <a:fontRef idx="minor">
+            <a:schemeClr val="tx1"/>
+          </a:fontRef>
+        </p:style>
+      </p:cxnSp>
+      <p:sp>
+        <p:nvSpPr>
+          <p:cNvPr id="78" name="Rectangle: Rounded Corners 77">
+            <a:extLst>
+              <a:ext uri="{FF2B5EF4-FFF2-40B4-BE49-F238E27FC236}">
+                <a16:creationId xmlns:a16="http://schemas.microsoft.com/office/drawing/2014/main" id="{9C02083D-B620-F448-2A6C-7E3FD2313FDD}"/>
+              </a:ext>
+            </a:extLst>
+          </p:cNvPr>
+          <p:cNvSpPr/>
+          <p:nvPr/>
+        </p:nvSpPr>
+        <p:spPr>
+          <a:xfrm>
+            <a:off x="2296874" y="1667508"/>
+            <a:ext cx="1335342" cy="261358"/>
+          </a:xfrm>
+          <a:prstGeom prst="roundRect">
+            <a:avLst/>
+          </a:prstGeom>
+          <a:solidFill>
+            <a:schemeClr val="bg1"/>
+          </a:solidFill>
+          <a:ln>
+            <a:solidFill>
+              <a:schemeClr val="accent2"/>
+            </a:solidFill>
+          </a:ln>
+        </p:spPr>
+        <p:style>
+          <a:lnRef idx="2">
+            <a:schemeClr val="accent1">
+              <a:shade val="50000"/>
+            </a:schemeClr>
+          </a:lnRef>
+          <a:fillRef idx="1">
+            <a:schemeClr val="accent1"/>
+          </a:fillRef>
+          <a:effectRef idx="0">
+            <a:schemeClr val="accent1"/>
+          </a:effectRef>
+          <a:fontRef idx="minor">
+            <a:schemeClr val="lt1"/>
+          </a:fontRef>
+        </p:style>
+        <p:txBody>
+          <a:bodyPr rtlCol="0" anchor="ctr"/>
+          <a:lstStyle/>
+          <a:p>
+            <a:pPr algn="ctr"/>
+            <a:r>
+              <a:rPr lang="en-US" sz="733" dirty="0" err="1">
+                <a:solidFill>
+                  <a:schemeClr val="tx1"/>
+                </a:solidFill>
+              </a:rPr>
+              <a:t>make_manuscript_map.Rmd</a:t>
+            </a:r>
+            <a:endParaRPr lang="en-US" sz="733" dirty="0">
+              <a:solidFill>
+                <a:schemeClr val="tx1"/>
+              </a:solidFill>
+            </a:endParaRPr>
+          </a:p>
+        </p:txBody>
+      </p:sp>
+      <p:cxnSp>
+        <p:nvCxnSpPr>
+          <p:cNvPr id="88" name="Straight Arrow Connector 87">
+            <a:extLst>
+              <a:ext uri="{FF2B5EF4-FFF2-40B4-BE49-F238E27FC236}">
+                <a16:creationId xmlns:a16="http://schemas.microsoft.com/office/drawing/2014/main" id="{67F3F9AE-4CE9-1694-6C81-448E4E22F26C}"/>
+              </a:ext>
+            </a:extLst>
+          </p:cNvPr>
+          <p:cNvCxnSpPr>
+            <a:cxnSpLocks/>
+            <a:stCxn id="54" idx="2"/>
+            <a:endCxn id="78" idx="0"/>
+          </p:cNvCxnSpPr>
+          <p:nvPr/>
+        </p:nvCxnSpPr>
+        <p:spPr>
+          <a:xfrm flipH="1">
+            <a:off x="2964545" y="897762"/>
+            <a:ext cx="2486921" cy="769746"/>
+          </a:xfrm>
+          <a:prstGeom prst="straightConnector1">
+            <a:avLst/>
+          </a:prstGeom>
+          <a:ln>
+            <a:tailEnd type="triangle"/>
+          </a:ln>
+        </p:spPr>
+        <p:style>
+          <a:lnRef idx="1">
+            <a:schemeClr val="accent1"/>
+          </a:lnRef>
+          <a:fillRef idx="0">
+            <a:schemeClr val="accent1"/>
+          </a:fillRef>
+          <a:effectRef idx="0">
+            <a:schemeClr val="accent1"/>
+          </a:effectRef>
+          <a:fontRef idx="minor">
+            <a:schemeClr val="tx1"/>
+          </a:fontRef>
+        </p:style>
+      </p:cxnSp>
+    </p:spTree>
+    <p:extLst>
+      <p:ext uri="{BB962C8B-B14F-4D97-AF65-F5344CB8AC3E}">
+        <p14:creationId xmlns:p14="http://schemas.microsoft.com/office/powerpoint/2010/main" val="605564297"/>
+      </p:ext>
+    </p:extLst>
+  </p:cSld>
+  <p:clrMapOvr>
+    <a:masterClrMapping/>
+  </p:clrMapOvr>
+</p:sld>
+</file>
+
 <file path=ppt/theme/theme1.xml><?xml version="1.0" encoding="utf-8"?>
 <a:theme xmlns:a="http://schemas.openxmlformats.org/drawingml/2006/main" name="Office Theme">
   <a:themeElements>

</xml_diff>